<commit_message>
Going over the presentation and compare to Euclidean metric
</commit_message>
<xml_diff>
--- a/MidPresentation.pptx
+++ b/MidPresentation.pptx
@@ -5,7 +5,7 @@
     <p:sldMasterId id="2147483648" r:id="rId1"/>
   </p:sldMasterIdLst>
   <p:notesMasterIdLst>
-    <p:notesMasterId r:id="rId9"/>
+    <p:notesMasterId r:id="rId13"/>
   </p:notesMasterIdLst>
   <p:sldIdLst>
     <p:sldId id="256" r:id="rId2"/>
@@ -14,7 +14,11 @@
     <p:sldId id="259" r:id="rId5"/>
     <p:sldId id="260" r:id="rId6"/>
     <p:sldId id="261" r:id="rId7"/>
-    <p:sldId id="262" r:id="rId8"/>
+    <p:sldId id="263" r:id="rId8"/>
+    <p:sldId id="265" r:id="rId9"/>
+    <p:sldId id="262" r:id="rId10"/>
+    <p:sldId id="266" r:id="rId11"/>
+    <p:sldId id="264" r:id="rId12"/>
   </p:sldIdLst>
   <p:sldSz cx="12192000" cy="6858000"/>
   <p:notesSz cx="6858000" cy="9144000"/>
@@ -206,7 +210,7 @@
           <a:p>
             <a:fld id="{A5AF5B30-50F5-41FD-B3FA-A2BD6AB5FBFF}" type="datetimeFigureOut">
               <a:rPr lang="en-US" smtClean="0"/>
-              <a:t>2/10/2017</a:t>
+              <a:t>2/12/2017</a:t>
             </a:fld>
             <a:endParaRPr lang="en-US"/>
           </a:p>
@@ -602,7 +606,7 @@
           <a:p>
             <a:fld id="{03744690-7276-4EBC-A781-F5D327809178}" type="datetimeFigureOut">
               <a:rPr lang="en-US" smtClean="0"/>
-              <a:t>2/10/2017</a:t>
+              <a:t>2/12/2017</a:t>
             </a:fld>
             <a:endParaRPr lang="en-US"/>
           </a:p>
@@ -770,7 +774,7 @@
           <a:p>
             <a:fld id="{03744690-7276-4EBC-A781-F5D327809178}" type="datetimeFigureOut">
               <a:rPr lang="en-US" smtClean="0"/>
-              <a:t>2/10/2017</a:t>
+              <a:t>2/12/2017</a:t>
             </a:fld>
             <a:endParaRPr lang="en-US"/>
           </a:p>
@@ -948,7 +952,7 @@
           <a:p>
             <a:fld id="{03744690-7276-4EBC-A781-F5D327809178}" type="datetimeFigureOut">
               <a:rPr lang="en-US" smtClean="0"/>
-              <a:t>2/10/2017</a:t>
+              <a:t>2/12/2017</a:t>
             </a:fld>
             <a:endParaRPr lang="en-US"/>
           </a:p>
@@ -1116,7 +1120,7 @@
           <a:p>
             <a:fld id="{03744690-7276-4EBC-A781-F5D327809178}" type="datetimeFigureOut">
               <a:rPr lang="en-US" smtClean="0"/>
-              <a:t>2/10/2017</a:t>
+              <a:t>2/12/2017</a:t>
             </a:fld>
             <a:endParaRPr lang="en-US"/>
           </a:p>
@@ -1361,7 +1365,7 @@
           <a:p>
             <a:fld id="{03744690-7276-4EBC-A781-F5D327809178}" type="datetimeFigureOut">
               <a:rPr lang="en-US" smtClean="0"/>
-              <a:t>2/10/2017</a:t>
+              <a:t>2/12/2017</a:t>
             </a:fld>
             <a:endParaRPr lang="en-US"/>
           </a:p>
@@ -1590,7 +1594,7 @@
           <a:p>
             <a:fld id="{03744690-7276-4EBC-A781-F5D327809178}" type="datetimeFigureOut">
               <a:rPr lang="en-US" smtClean="0"/>
-              <a:t>2/10/2017</a:t>
+              <a:t>2/12/2017</a:t>
             </a:fld>
             <a:endParaRPr lang="en-US"/>
           </a:p>
@@ -1954,7 +1958,7 @@
           <a:p>
             <a:fld id="{03744690-7276-4EBC-A781-F5D327809178}" type="datetimeFigureOut">
               <a:rPr lang="en-US" smtClean="0"/>
-              <a:t>2/10/2017</a:t>
+              <a:t>2/12/2017</a:t>
             </a:fld>
             <a:endParaRPr lang="en-US"/>
           </a:p>
@@ -2071,7 +2075,7 @@
           <a:p>
             <a:fld id="{03744690-7276-4EBC-A781-F5D327809178}" type="datetimeFigureOut">
               <a:rPr lang="en-US" smtClean="0"/>
-              <a:t>2/10/2017</a:t>
+              <a:t>2/12/2017</a:t>
             </a:fld>
             <a:endParaRPr lang="en-US"/>
           </a:p>
@@ -2166,7 +2170,7 @@
           <a:p>
             <a:fld id="{03744690-7276-4EBC-A781-F5D327809178}" type="datetimeFigureOut">
               <a:rPr lang="en-US" smtClean="0"/>
-              <a:t>2/10/2017</a:t>
+              <a:t>2/12/2017</a:t>
             </a:fld>
             <a:endParaRPr lang="en-US"/>
           </a:p>
@@ -2441,7 +2445,7 @@
           <a:p>
             <a:fld id="{03744690-7276-4EBC-A781-F5D327809178}" type="datetimeFigureOut">
               <a:rPr lang="en-US" smtClean="0"/>
-              <a:t>2/10/2017</a:t>
+              <a:t>2/12/2017</a:t>
             </a:fld>
             <a:endParaRPr lang="en-US"/>
           </a:p>
@@ -2693,7 +2697,7 @@
           <a:p>
             <a:fld id="{03744690-7276-4EBC-A781-F5D327809178}" type="datetimeFigureOut">
               <a:rPr lang="en-US" smtClean="0"/>
-              <a:t>2/10/2017</a:t>
+              <a:t>2/12/2017</a:t>
             </a:fld>
             <a:endParaRPr lang="en-US"/>
           </a:p>
@@ -2904,7 +2908,7 @@
           <a:p>
             <a:fld id="{03744690-7276-4EBC-A781-F5D327809178}" type="datetimeFigureOut">
               <a:rPr lang="en-US" smtClean="0"/>
-              <a:t>2/10/2017</a:t>
+              <a:t>2/12/2017</a:t>
             </a:fld>
             <a:endParaRPr lang="en-US"/>
           </a:p>
@@ -3326,15 +3330,16 @@
           <a:p>
             <a:r>
               <a:rPr lang="en-US" dirty="0"/>
-              <a:t>Events Classification</a:t>
+              <a:t>Events </a:t>
+            </a:r>
+            <a:r>
+              <a:rPr lang="en-US" dirty="0" smtClean="0"/>
+              <a:t>Detection</a:t>
             </a:r>
             <a:br>
-              <a:rPr lang="en-US" dirty="0"/>
+              <a:rPr lang="en-US" dirty="0" smtClean="0"/>
             </a:br>
-            <a:r>
-              <a:rPr lang="en-US" dirty="0"/>
-              <a:t>(and more…)</a:t>
-            </a:r>
+            <a:endParaRPr lang="en-US" dirty="0"/>
           </a:p>
         </p:txBody>
       </p:sp>
@@ -3367,10 +3372,17 @@
   <p:clrMapOvr>
     <a:masterClrMapping/>
   </p:clrMapOvr>
+  <p:timing>
+    <p:tnLst>
+      <p:par>
+        <p:cTn id="1" dur="indefinite" restart="never" nodeType="tmRoot"/>
+      </p:par>
+    </p:tnLst>
+  </p:timing>
 </p:sld>
 </file>
 
-<file path=ppt/slides/slide2.xml><?xml version="1.0" encoding="utf-8"?>
+<file path=ppt/slides/slide10.xml><?xml version="1.0" encoding="utf-8"?>
 <p:sld xmlns:a="http://schemas.openxmlformats.org/drawingml/2006/main" xmlns:r="http://schemas.openxmlformats.org/officeDocument/2006/relationships" xmlns:p="http://schemas.openxmlformats.org/presentationml/2006/main">
   <p:cSld>
     <p:spTree>
@@ -3387,6 +3399,35 @@
           <a:chExt cx="0" cy="0"/>
         </a:xfrm>
       </p:grpSpPr>
+      <p:pic>
+        <p:nvPicPr>
+          <p:cNvPr id="10" name="Picture 9"/>
+          <p:cNvPicPr>
+            <a:picLocks noChangeAspect="1"/>
+          </p:cNvPicPr>
+          <p:nvPr/>
+        </p:nvPicPr>
+        <p:blipFill rotWithShape="1">
+          <a:blip r:embed="rId2">
+            <a:extLst>
+              <a:ext uri="{28A0092B-C50C-407E-A947-70E740481C1C}">
+                <a14:useLocalDpi xmlns:a14="http://schemas.microsoft.com/office/drawing/2010/main" val="0"/>
+              </a:ext>
+            </a:extLst>
+          </a:blip>
+          <a:srcRect l="31822" t="18759" r="21335" b="7107"/>
+          <a:stretch/>
+        </p:blipFill>
+        <p:spPr>
+          <a:xfrm>
+            <a:off x="4981574" y="266700"/>
+            <a:ext cx="6381751" cy="6343650"/>
+          </a:xfrm>
+          <a:prstGeom prst="rect">
+            <a:avLst/>
+          </a:prstGeom>
+        </p:spPr>
+      </p:pic>
       <p:sp>
         <p:nvSpPr>
           <p:cNvPr id="2" name="Title 1"/>
@@ -3403,41 +3444,557 @@
           <a:lstStyle/>
           <a:p>
             <a:r>
-              <a:rPr lang="en-US" dirty="0"/>
-              <a:t>Log Book – Sensors</a:t>
-            </a:r>
-          </a:p>
-        </p:txBody>
-      </p:sp>
-      <p:pic>
-        <p:nvPicPr>
-          <p:cNvPr id="4" name="Content Placeholder 3"/>
-          <p:cNvPicPr>
-            <a:picLocks noGrp="1" noChangeAspect="1"/>
-          </p:cNvPicPr>
+              <a:rPr lang="en-US" dirty="0" smtClean="0"/>
+              <a:t>Comparison to</a:t>
+            </a:r>
+            <a:br>
+              <a:rPr lang="en-US" dirty="0" smtClean="0"/>
+            </a:br>
+            <a:r>
+              <a:rPr lang="en-US" dirty="0" smtClean="0"/>
+              <a:t>Euclidean Metric</a:t>
+            </a:r>
+            <a:endParaRPr lang="en-US" dirty="0"/>
+          </a:p>
+        </p:txBody>
+      </p:sp>
+      <p:sp>
+        <p:nvSpPr>
+          <p:cNvPr id="3" name="Content Placeholder 2"/>
+          <p:cNvSpPr>
+            <a:spLocks noGrp="1"/>
+          </p:cNvSpPr>
           <p:nvPr>
             <p:ph idx="1"/>
           </p:nvPr>
-        </p:nvPicPr>
-        <p:blipFill>
-          <a:blip r:embed="rId2"/>
-          <a:stretch>
-            <a:fillRect/>
-          </a:stretch>
-        </p:blipFill>
+        </p:nvSpPr>
         <p:spPr>
           <a:xfrm>
-            <a:off x="8402595" y="0"/>
-            <a:ext cx="3789405" cy="5972705"/>
+            <a:off x="0" y="1870977"/>
+            <a:ext cx="4917166" cy="4351338"/>
+          </a:xfrm>
+        </p:spPr>
+        <p:txBody>
+          <a:bodyPr/>
+          <a:lstStyle/>
+          <a:p>
+            <a:r>
+              <a:rPr lang="en-US" dirty="0"/>
+              <a:t>Removing quite times.</a:t>
+            </a:r>
+            <a:br>
+              <a:rPr lang="en-US" dirty="0"/>
+            </a:br>
+            <a:r>
+              <a:rPr lang="en-US" dirty="0"/>
+              <a:t>(so either distractor or tool</a:t>
+            </a:r>
+            <a:br>
+              <a:rPr lang="en-US" dirty="0"/>
+            </a:br>
+            <a:r>
+              <a:rPr lang="en-US" dirty="0"/>
+              <a:t>is in the log –book).</a:t>
+            </a:r>
+            <a:br>
+              <a:rPr lang="en-US" dirty="0"/>
+            </a:br>
+            <a:endParaRPr lang="en-US" dirty="0"/>
+          </a:p>
+          <a:p>
+            <a:r>
+              <a:rPr lang="en-US" dirty="0"/>
+              <a:t>11 Classes.</a:t>
+            </a:r>
+            <a:br>
+              <a:rPr lang="en-US" dirty="0"/>
+            </a:br>
+            <a:endParaRPr lang="en-US" dirty="0"/>
+          </a:p>
+          <a:p>
+            <a:r>
+              <a:rPr lang="en-US" dirty="0"/>
+              <a:t>2,396 samples.</a:t>
+            </a:r>
+            <a:br>
+              <a:rPr lang="en-US" dirty="0"/>
+            </a:br>
+            <a:endParaRPr lang="en-US" dirty="0"/>
+          </a:p>
+          <a:p>
+            <a:r>
+              <a:rPr lang="en-US" dirty="0"/>
+              <a:t>Using Ensemble Subspace </a:t>
+            </a:r>
+            <a:r>
+              <a:rPr lang="en-US" dirty="0" err="1"/>
+              <a:t>Knn</a:t>
+            </a:r>
+            <a:r>
+              <a:rPr lang="en-US" dirty="0"/>
+              <a:t>:</a:t>
+            </a:r>
+            <a:br>
+              <a:rPr lang="en-US" dirty="0"/>
+            </a:br>
+            <a:r>
+              <a:rPr lang="en-US" dirty="0" smtClean="0"/>
+              <a:t>84.8</a:t>
+            </a:r>
+            <a:r>
+              <a:rPr lang="en-US" dirty="0"/>
+              <a:t>% accuracy.</a:t>
+            </a:r>
+          </a:p>
+        </p:txBody>
+      </p:sp>
+      <p:sp>
+        <p:nvSpPr>
+          <p:cNvPr id="5" name="Rectangle 4"/>
+          <p:cNvSpPr/>
+          <p:nvPr/>
+        </p:nvSpPr>
+        <p:spPr>
+          <a:xfrm>
+            <a:off x="6210300" y="447676"/>
+            <a:ext cx="876300" cy="884238"/>
           </a:xfrm>
           <a:prstGeom prst="rect">
             <a:avLst/>
           </a:prstGeom>
+          <a:solidFill>
+            <a:schemeClr val="tx1">
+              <a:alpha val="20000"/>
+            </a:schemeClr>
+          </a:solidFill>
+          <a:ln>
+            <a:solidFill>
+              <a:schemeClr val="tx1"/>
+            </a:solidFill>
+          </a:ln>
         </p:spPr>
-      </p:pic>
-      <p:sp>
-        <p:nvSpPr>
-          <p:cNvPr id="5" name="Content Placeholder 2"/>
+        <p:style>
+          <a:lnRef idx="2">
+            <a:schemeClr val="accent1">
+              <a:shade val="50000"/>
+            </a:schemeClr>
+          </a:lnRef>
+          <a:fillRef idx="1">
+            <a:schemeClr val="accent1"/>
+          </a:fillRef>
+          <a:effectRef idx="0">
+            <a:schemeClr val="accent1"/>
+          </a:effectRef>
+          <a:fontRef idx="minor">
+            <a:schemeClr val="lt1"/>
+          </a:fontRef>
+        </p:style>
+        <p:txBody>
+          <a:bodyPr rtlCol="0" anchor="ctr"/>
+          <a:lstStyle/>
+          <a:p>
+            <a:pPr algn="ctr"/>
+            <a:endParaRPr lang="en-US" dirty="0"/>
+          </a:p>
+        </p:txBody>
+      </p:sp>
+      <p:sp>
+        <p:nvSpPr>
+          <p:cNvPr id="6" name="Rectangle 5"/>
+          <p:cNvSpPr/>
+          <p:nvPr/>
+        </p:nvSpPr>
+        <p:spPr>
+          <a:xfrm>
+            <a:off x="7105649" y="1322388"/>
+            <a:ext cx="1321709" cy="1335087"/>
+          </a:xfrm>
+          <a:prstGeom prst="rect">
+            <a:avLst/>
+          </a:prstGeom>
+          <a:solidFill>
+            <a:schemeClr val="tx1">
+              <a:alpha val="20000"/>
+            </a:schemeClr>
+          </a:solidFill>
+          <a:ln>
+            <a:solidFill>
+              <a:schemeClr val="tx1"/>
+            </a:solidFill>
+          </a:ln>
+        </p:spPr>
+        <p:style>
+          <a:lnRef idx="2">
+            <a:schemeClr val="accent1">
+              <a:shade val="50000"/>
+            </a:schemeClr>
+          </a:lnRef>
+          <a:fillRef idx="1">
+            <a:schemeClr val="accent1"/>
+          </a:fillRef>
+          <a:effectRef idx="0">
+            <a:schemeClr val="accent1"/>
+          </a:effectRef>
+          <a:fontRef idx="minor">
+            <a:schemeClr val="lt1"/>
+          </a:fontRef>
+        </p:style>
+        <p:txBody>
+          <a:bodyPr rtlCol="0" anchor="ctr"/>
+          <a:lstStyle/>
+          <a:p>
+            <a:pPr algn="ctr"/>
+            <a:endParaRPr lang="en-US" dirty="0"/>
+          </a:p>
+        </p:txBody>
+      </p:sp>
+      <p:sp>
+        <p:nvSpPr>
+          <p:cNvPr id="7" name="Rectangle 6"/>
+          <p:cNvSpPr/>
+          <p:nvPr/>
+        </p:nvSpPr>
+        <p:spPr>
+          <a:xfrm>
+            <a:off x="8433708" y="2667001"/>
+            <a:ext cx="1321709" cy="1317624"/>
+          </a:xfrm>
+          <a:prstGeom prst="rect">
+            <a:avLst/>
+          </a:prstGeom>
+          <a:solidFill>
+            <a:schemeClr val="tx1">
+              <a:alpha val="20000"/>
+            </a:schemeClr>
+          </a:solidFill>
+          <a:ln>
+            <a:solidFill>
+              <a:schemeClr val="tx1"/>
+            </a:solidFill>
+          </a:ln>
+        </p:spPr>
+        <p:style>
+          <a:lnRef idx="2">
+            <a:schemeClr val="accent1">
+              <a:shade val="50000"/>
+            </a:schemeClr>
+          </a:lnRef>
+          <a:fillRef idx="1">
+            <a:schemeClr val="accent1"/>
+          </a:fillRef>
+          <a:effectRef idx="0">
+            <a:schemeClr val="accent1"/>
+          </a:effectRef>
+          <a:fontRef idx="minor">
+            <a:schemeClr val="lt1"/>
+          </a:fontRef>
+        </p:style>
+        <p:txBody>
+          <a:bodyPr rtlCol="0" anchor="ctr"/>
+          <a:lstStyle/>
+          <a:p>
+            <a:pPr algn="ctr"/>
+            <a:endParaRPr lang="en-US" dirty="0"/>
+          </a:p>
+        </p:txBody>
+      </p:sp>
+      <p:sp>
+        <p:nvSpPr>
+          <p:cNvPr id="9" name="TextBox 8"/>
+          <p:cNvSpPr txBox="1"/>
+          <p:nvPr/>
+        </p:nvSpPr>
+        <p:spPr>
+          <a:xfrm>
+            <a:off x="6728836" y="478115"/>
+            <a:ext cx="896720" cy="369332"/>
+          </a:xfrm>
+          <a:prstGeom prst="rect">
+            <a:avLst/>
+          </a:prstGeom>
+          <a:noFill/>
+        </p:spPr>
+        <p:txBody>
+          <a:bodyPr wrap="none" rtlCol="0">
+            <a:spAutoFit/>
+          </a:bodyPr>
+          <a:lstStyle/>
+          <a:p>
+            <a:r>
+              <a:rPr lang="en-US" dirty="0">
+                <a:solidFill>
+                  <a:srgbClr val="00B0F0"/>
+                </a:solidFill>
+              </a:rPr>
+              <a:t>No Tool</a:t>
+            </a:r>
+          </a:p>
+        </p:txBody>
+      </p:sp>
+      <p:sp>
+        <p:nvSpPr>
+          <p:cNvPr id="15" name="TextBox 14"/>
+          <p:cNvSpPr txBox="1"/>
+          <p:nvPr/>
+        </p:nvSpPr>
+        <p:spPr>
+          <a:xfrm>
+            <a:off x="7988523" y="1366152"/>
+            <a:ext cx="856645" cy="369332"/>
+          </a:xfrm>
+          <a:prstGeom prst="rect">
+            <a:avLst/>
+          </a:prstGeom>
+          <a:noFill/>
+        </p:spPr>
+        <p:txBody>
+          <a:bodyPr wrap="none" rtlCol="0">
+            <a:spAutoFit/>
+          </a:bodyPr>
+          <a:lstStyle/>
+          <a:p>
+            <a:r>
+              <a:rPr lang="en-US" dirty="0">
+                <a:solidFill>
+                  <a:srgbClr val="00B0F0"/>
+                </a:solidFill>
+              </a:rPr>
+              <a:t>Tool ‘h’</a:t>
+            </a:r>
+          </a:p>
+        </p:txBody>
+      </p:sp>
+      <p:sp>
+        <p:nvSpPr>
+          <p:cNvPr id="16" name="TextBox 15"/>
+          <p:cNvSpPr txBox="1"/>
+          <p:nvPr/>
+        </p:nvSpPr>
+        <p:spPr>
+          <a:xfrm>
+            <a:off x="8914647" y="2709347"/>
+            <a:ext cx="798232" cy="369332"/>
+          </a:xfrm>
+          <a:prstGeom prst="rect">
+            <a:avLst/>
+          </a:prstGeom>
+          <a:noFill/>
+        </p:spPr>
+        <p:txBody>
+          <a:bodyPr wrap="none" rtlCol="0">
+            <a:spAutoFit/>
+          </a:bodyPr>
+          <a:lstStyle/>
+          <a:p>
+            <a:r>
+              <a:rPr lang="en-US" dirty="0">
+                <a:solidFill>
+                  <a:srgbClr val="00B0F0"/>
+                </a:solidFill>
+              </a:rPr>
+              <a:t>Tool ‘j’</a:t>
+            </a:r>
+          </a:p>
+        </p:txBody>
+      </p:sp>
+      <p:sp>
+        <p:nvSpPr>
+          <p:cNvPr id="17" name="TextBox 16"/>
+          <p:cNvSpPr txBox="1"/>
+          <p:nvPr/>
+        </p:nvSpPr>
+        <p:spPr>
+          <a:xfrm>
+            <a:off x="9898483" y="3617566"/>
+            <a:ext cx="863057" cy="369332"/>
+          </a:xfrm>
+          <a:prstGeom prst="rect">
+            <a:avLst/>
+          </a:prstGeom>
+          <a:noFill/>
+        </p:spPr>
+        <p:txBody>
+          <a:bodyPr wrap="none" rtlCol="0">
+            <a:spAutoFit/>
+          </a:bodyPr>
+          <a:lstStyle/>
+          <a:p>
+            <a:r>
+              <a:rPr lang="en-US" dirty="0">
+                <a:solidFill>
+                  <a:srgbClr val="00B0F0"/>
+                </a:solidFill>
+              </a:rPr>
+              <a:t>Tool ‘n’</a:t>
+            </a:r>
+          </a:p>
+        </p:txBody>
+      </p:sp>
+      <p:sp>
+        <p:nvSpPr>
+          <p:cNvPr id="8" name="Rectangle 7"/>
+          <p:cNvSpPr/>
+          <p:nvPr/>
+        </p:nvSpPr>
+        <p:spPr>
+          <a:xfrm>
+            <a:off x="9764942" y="3984625"/>
+            <a:ext cx="1321709" cy="1330326"/>
+          </a:xfrm>
+          <a:prstGeom prst="rect">
+            <a:avLst/>
+          </a:prstGeom>
+          <a:solidFill>
+            <a:schemeClr val="tx1">
+              <a:alpha val="20000"/>
+            </a:schemeClr>
+          </a:solidFill>
+          <a:ln>
+            <a:solidFill>
+              <a:schemeClr val="tx1"/>
+            </a:solidFill>
+          </a:ln>
+        </p:spPr>
+        <p:style>
+          <a:lnRef idx="2">
+            <a:schemeClr val="accent1">
+              <a:shade val="50000"/>
+            </a:schemeClr>
+          </a:lnRef>
+          <a:fillRef idx="1">
+            <a:schemeClr val="accent1"/>
+          </a:fillRef>
+          <a:effectRef idx="0">
+            <a:schemeClr val="accent1"/>
+          </a:effectRef>
+          <a:fontRef idx="minor">
+            <a:schemeClr val="lt1"/>
+          </a:fontRef>
+        </p:style>
+        <p:txBody>
+          <a:bodyPr rtlCol="0" anchor="ctr"/>
+          <a:lstStyle/>
+          <a:p>
+            <a:pPr algn="ctr"/>
+            <a:endParaRPr lang="en-US" dirty="0"/>
+          </a:p>
+        </p:txBody>
+      </p:sp>
+    </p:spTree>
+    <p:extLst>
+      <p:ext uri="{BB962C8B-B14F-4D97-AF65-F5344CB8AC3E}">
+        <p14:creationId xmlns:p14="http://schemas.microsoft.com/office/powerpoint/2010/main" val="2254358210"/>
+      </p:ext>
+    </p:extLst>
+  </p:cSld>
+  <p:clrMapOvr>
+    <a:masterClrMapping/>
+  </p:clrMapOvr>
+  <p:timing>
+    <p:tnLst>
+      <p:par>
+        <p:cTn id="1" dur="indefinite" restart="never" nodeType="tmRoot"/>
+      </p:par>
+    </p:tnLst>
+  </p:timing>
+</p:sld>
+</file>
+
+<file path=ppt/slides/slide11.xml><?xml version="1.0" encoding="utf-8"?>
+<p:sld xmlns:a="http://schemas.openxmlformats.org/drawingml/2006/main" xmlns:r="http://schemas.openxmlformats.org/officeDocument/2006/relationships" xmlns:p="http://schemas.openxmlformats.org/presentationml/2006/main">
+  <p:cSld>
+    <p:spTree>
+      <p:nvGrpSpPr>
+        <p:cNvPr id="1" name=""/>
+        <p:cNvGrpSpPr/>
+        <p:nvPr/>
+      </p:nvGrpSpPr>
+      <p:grpSpPr>
+        <a:xfrm>
+          <a:off x="0" y="0"/>
+          <a:ext cx="0" cy="0"/>
+          <a:chOff x="0" y="0"/>
+          <a:chExt cx="0" cy="0"/>
+        </a:xfrm>
+      </p:grpSpPr>
+      <p:sp>
+        <p:nvSpPr>
+          <p:cNvPr id="2" name="Title 1"/>
+          <p:cNvSpPr>
+            <a:spLocks noGrp="1"/>
+          </p:cNvSpPr>
+          <p:nvPr>
+            <p:ph type="title"/>
+          </p:nvPr>
+        </p:nvSpPr>
+        <p:spPr>
+          <a:xfrm>
+            <a:off x="0" y="-276225"/>
+            <a:ext cx="10515600" cy="1325563"/>
+          </a:xfrm>
+        </p:spPr>
+        <p:txBody>
+          <a:bodyPr/>
+          <a:lstStyle/>
+          <a:p>
+            <a:r>
+              <a:rPr lang="en-US" dirty="0" smtClean="0"/>
+              <a:t>Summary</a:t>
+            </a:r>
+            <a:endParaRPr lang="en-US" dirty="0"/>
+          </a:p>
+        </p:txBody>
+      </p:sp>
+      <p:sp>
+        <p:nvSpPr>
+          <p:cNvPr id="3" name="Content Placeholder 2"/>
+          <p:cNvSpPr>
+            <a:spLocks noGrp="1"/>
+          </p:cNvSpPr>
+          <p:nvPr>
+            <p:ph idx="1"/>
+          </p:nvPr>
+        </p:nvSpPr>
+        <p:spPr>
+          <a:xfrm>
+            <a:off x="38100" y="794652"/>
+            <a:ext cx="12192001" cy="2758173"/>
+          </a:xfrm>
+        </p:spPr>
+        <p:txBody>
+          <a:bodyPr>
+            <a:normAutofit/>
+          </a:bodyPr>
+          <a:lstStyle/>
+          <a:p>
+            <a:r>
+              <a:rPr lang="en-US" dirty="0" smtClean="0"/>
+              <a:t>This is an early stage solution for managing expectations.</a:t>
+            </a:r>
+          </a:p>
+          <a:p>
+            <a:endParaRPr lang="en-US" dirty="0" smtClean="0"/>
+          </a:p>
+          <a:p>
+            <a:r>
+              <a:rPr lang="en-US" dirty="0" smtClean="0"/>
+              <a:t>Simple approach: detection and classification under supervised setting.</a:t>
+            </a:r>
+          </a:p>
+          <a:p>
+            <a:endParaRPr lang="en-US" dirty="0" smtClean="0"/>
+          </a:p>
+          <a:p>
+            <a:r>
+              <a:rPr lang="en-US" dirty="0" smtClean="0"/>
+              <a:t>Main result: the discrimination capability of the features and the metric.</a:t>
+            </a:r>
+          </a:p>
+        </p:txBody>
+      </p:sp>
+      <p:sp>
+        <p:nvSpPr>
+          <p:cNvPr id="4" name="Content Placeholder 2"/>
           <p:cNvSpPr txBox="1">
             <a:spLocks/>
           </p:cNvSpPr>
@@ -3445,8 +4002,8 @@
         </p:nvSpPr>
         <p:spPr>
           <a:xfrm>
-            <a:off x="0" y="1347102"/>
-            <a:ext cx="10515600" cy="4351338"/>
+            <a:off x="38100" y="4471302"/>
+            <a:ext cx="12192001" cy="2386698"/>
           </a:xfrm>
           <a:prstGeom prst="rect">
             <a:avLst/>
@@ -3622,6 +4179,352 @@
           </a:lstStyle>
           <a:p>
             <a:r>
+              <a:rPr lang="en-US" dirty="0" smtClean="0"/>
+              <a:t>what should be the framework?</a:t>
+            </a:r>
+            <a:br>
+              <a:rPr lang="en-US" dirty="0" smtClean="0"/>
+            </a:br>
+            <a:r>
+              <a:rPr lang="en-US" dirty="0" smtClean="0"/>
+              <a:t>supervised / unsupervised, available sets of all possible tools and distractors.</a:t>
+            </a:r>
+          </a:p>
+          <a:p>
+            <a:endParaRPr lang="en-US" dirty="0" smtClean="0"/>
+          </a:p>
+          <a:p>
+            <a:r>
+              <a:rPr lang="en-US" dirty="0" smtClean="0"/>
+              <a:t>Next step, incorporate time using kernels and new definitions of Riemannian metrics for joint time and space geometry analysis.</a:t>
+            </a:r>
+          </a:p>
+          <a:p>
+            <a:endParaRPr lang="en-US" dirty="0" smtClean="0"/>
+          </a:p>
+        </p:txBody>
+      </p:sp>
+      <p:sp>
+        <p:nvSpPr>
+          <p:cNvPr id="5" name="Title 1"/>
+          <p:cNvSpPr txBox="1">
+            <a:spLocks/>
+          </p:cNvSpPr>
+          <p:nvPr/>
+        </p:nvSpPr>
+        <p:spPr>
+          <a:xfrm>
+            <a:off x="0" y="3294170"/>
+            <a:ext cx="10515600" cy="1325563"/>
+          </a:xfrm>
+          <a:prstGeom prst="rect">
+            <a:avLst/>
+          </a:prstGeom>
+        </p:spPr>
+        <p:txBody>
+          <a:bodyPr vert="horz" lIns="91440" tIns="45720" rIns="91440" bIns="45720" rtlCol="0" anchor="ctr">
+            <a:normAutofit/>
+          </a:bodyPr>
+          <a:lstStyle>
+            <a:lvl1pPr algn="l" defTabSz="914400" rtl="0" eaLnBrk="1" latinLnBrk="0" hangingPunct="1">
+              <a:lnSpc>
+                <a:spcPct val="90000"/>
+              </a:lnSpc>
+              <a:spcBef>
+                <a:spcPct val="0"/>
+              </a:spcBef>
+              <a:buNone/>
+              <a:defRPr sz="4400" kern="1200">
+                <a:solidFill>
+                  <a:schemeClr val="tx1"/>
+                </a:solidFill>
+                <a:latin typeface="+mj-lt"/>
+                <a:ea typeface="+mj-ea"/>
+                <a:cs typeface="+mj-cs"/>
+              </a:defRPr>
+            </a:lvl1pPr>
+          </a:lstStyle>
+          <a:p>
+            <a:r>
+              <a:rPr lang="en-US" dirty="0" smtClean="0"/>
+              <a:t>Discussion</a:t>
+            </a:r>
+            <a:endParaRPr lang="en-US" dirty="0"/>
+          </a:p>
+        </p:txBody>
+      </p:sp>
+    </p:spTree>
+    <p:extLst>
+      <p:ext uri="{BB962C8B-B14F-4D97-AF65-F5344CB8AC3E}">
+        <p14:creationId xmlns:p14="http://schemas.microsoft.com/office/powerpoint/2010/main" val="2481802472"/>
+      </p:ext>
+    </p:extLst>
+  </p:cSld>
+  <p:clrMapOvr>
+    <a:masterClrMapping/>
+  </p:clrMapOvr>
+  <p:timing>
+    <p:tnLst>
+      <p:par>
+        <p:cTn id="1" dur="indefinite" restart="never" nodeType="tmRoot"/>
+      </p:par>
+    </p:tnLst>
+  </p:timing>
+</p:sld>
+</file>
+
+<file path=ppt/slides/slide2.xml><?xml version="1.0" encoding="utf-8"?>
+<p:sld xmlns:a="http://schemas.openxmlformats.org/drawingml/2006/main" xmlns:r="http://schemas.openxmlformats.org/officeDocument/2006/relationships" xmlns:p="http://schemas.openxmlformats.org/presentationml/2006/main">
+  <p:cSld>
+    <p:spTree>
+      <p:nvGrpSpPr>
+        <p:cNvPr id="1" name=""/>
+        <p:cNvGrpSpPr/>
+        <p:nvPr/>
+      </p:nvGrpSpPr>
+      <p:grpSpPr>
+        <a:xfrm>
+          <a:off x="0" y="0"/>
+          <a:ext cx="0" cy="0"/>
+          <a:chOff x="0" y="0"/>
+          <a:chExt cx="0" cy="0"/>
+        </a:xfrm>
+      </p:grpSpPr>
+      <p:sp>
+        <p:nvSpPr>
+          <p:cNvPr id="2" name="Title 1"/>
+          <p:cNvSpPr>
+            <a:spLocks noGrp="1"/>
+          </p:cNvSpPr>
+          <p:nvPr>
+            <p:ph type="title"/>
+          </p:nvPr>
+        </p:nvSpPr>
+        <p:spPr/>
+        <p:txBody>
+          <a:bodyPr/>
+          <a:lstStyle/>
+          <a:p>
+            <a:r>
+              <a:rPr lang="en-US" dirty="0"/>
+              <a:t>Log Book – Sensors</a:t>
+            </a:r>
+          </a:p>
+        </p:txBody>
+      </p:sp>
+      <p:pic>
+        <p:nvPicPr>
+          <p:cNvPr id="4" name="Content Placeholder 3"/>
+          <p:cNvPicPr>
+            <a:picLocks noGrp="1" noChangeAspect="1"/>
+          </p:cNvPicPr>
+          <p:nvPr>
+            <p:ph idx="1"/>
+          </p:nvPr>
+        </p:nvPicPr>
+        <p:blipFill>
+          <a:blip r:embed="rId2"/>
+          <a:stretch>
+            <a:fillRect/>
+          </a:stretch>
+        </p:blipFill>
+        <p:spPr>
+          <a:xfrm>
+            <a:off x="8402595" y="0"/>
+            <a:ext cx="3789405" cy="5972705"/>
+          </a:xfrm>
+          <a:prstGeom prst="rect">
+            <a:avLst/>
+          </a:prstGeom>
+        </p:spPr>
+      </p:pic>
+      <p:sp>
+        <p:nvSpPr>
+          <p:cNvPr id="5" name="Content Placeholder 2"/>
+          <p:cNvSpPr txBox="1">
+            <a:spLocks/>
+          </p:cNvSpPr>
+          <p:nvPr/>
+        </p:nvSpPr>
+        <p:spPr>
+          <a:xfrm>
+            <a:off x="0" y="1347102"/>
+            <a:ext cx="10515600" cy="4351338"/>
+          </a:xfrm>
+          <a:prstGeom prst="rect">
+            <a:avLst/>
+          </a:prstGeom>
+        </p:spPr>
+        <p:txBody>
+          <a:bodyPr vert="horz" lIns="91440" tIns="45720" rIns="91440" bIns="45720" rtlCol="0">
+            <a:normAutofit/>
+          </a:bodyPr>
+          <a:lstStyle>
+            <a:lvl1pPr marL="228600" indent="-228600" algn="l" defTabSz="914400" rtl="0" eaLnBrk="1" latinLnBrk="0" hangingPunct="1">
+              <a:lnSpc>
+                <a:spcPct val="90000"/>
+              </a:lnSpc>
+              <a:spcBef>
+                <a:spcPts val="1000"/>
+              </a:spcBef>
+              <a:buFont typeface="Arial" panose="020B0604020202020204" pitchFamily="34" charset="0"/>
+              <a:buChar char="•"/>
+              <a:defRPr sz="2800" kern="1200">
+                <a:solidFill>
+                  <a:schemeClr val="tx1"/>
+                </a:solidFill>
+                <a:latin typeface="+mn-lt"/>
+                <a:ea typeface="+mn-ea"/>
+                <a:cs typeface="+mn-cs"/>
+              </a:defRPr>
+            </a:lvl1pPr>
+            <a:lvl2pPr marL="685800" indent="-228600" algn="l" defTabSz="914400" rtl="0" eaLnBrk="1" latinLnBrk="0" hangingPunct="1">
+              <a:lnSpc>
+                <a:spcPct val="90000"/>
+              </a:lnSpc>
+              <a:spcBef>
+                <a:spcPts val="500"/>
+              </a:spcBef>
+              <a:buFont typeface="Arial" panose="020B0604020202020204" pitchFamily="34" charset="0"/>
+              <a:buChar char="•"/>
+              <a:defRPr sz="2400" kern="1200">
+                <a:solidFill>
+                  <a:schemeClr val="tx1"/>
+                </a:solidFill>
+                <a:latin typeface="+mn-lt"/>
+                <a:ea typeface="+mn-ea"/>
+                <a:cs typeface="+mn-cs"/>
+              </a:defRPr>
+            </a:lvl2pPr>
+            <a:lvl3pPr marL="1143000" indent="-228600" algn="l" defTabSz="914400" rtl="0" eaLnBrk="1" latinLnBrk="0" hangingPunct="1">
+              <a:lnSpc>
+                <a:spcPct val="90000"/>
+              </a:lnSpc>
+              <a:spcBef>
+                <a:spcPts val="500"/>
+              </a:spcBef>
+              <a:buFont typeface="Arial" panose="020B0604020202020204" pitchFamily="34" charset="0"/>
+              <a:buChar char="•"/>
+              <a:defRPr sz="2000" kern="1200">
+                <a:solidFill>
+                  <a:schemeClr val="tx1"/>
+                </a:solidFill>
+                <a:latin typeface="+mn-lt"/>
+                <a:ea typeface="+mn-ea"/>
+                <a:cs typeface="+mn-cs"/>
+              </a:defRPr>
+            </a:lvl3pPr>
+            <a:lvl4pPr marL="1600200" indent="-228600" algn="l" defTabSz="914400" rtl="0" eaLnBrk="1" latinLnBrk="0" hangingPunct="1">
+              <a:lnSpc>
+                <a:spcPct val="90000"/>
+              </a:lnSpc>
+              <a:spcBef>
+                <a:spcPts val="500"/>
+              </a:spcBef>
+              <a:buFont typeface="Arial" panose="020B0604020202020204" pitchFamily="34" charset="0"/>
+              <a:buChar char="•"/>
+              <a:defRPr sz="1800" kern="1200">
+                <a:solidFill>
+                  <a:schemeClr val="tx1"/>
+                </a:solidFill>
+                <a:latin typeface="+mn-lt"/>
+                <a:ea typeface="+mn-ea"/>
+                <a:cs typeface="+mn-cs"/>
+              </a:defRPr>
+            </a:lvl4pPr>
+            <a:lvl5pPr marL="2057400" indent="-228600" algn="l" defTabSz="914400" rtl="0" eaLnBrk="1" latinLnBrk="0" hangingPunct="1">
+              <a:lnSpc>
+                <a:spcPct val="90000"/>
+              </a:lnSpc>
+              <a:spcBef>
+                <a:spcPts val="500"/>
+              </a:spcBef>
+              <a:buFont typeface="Arial" panose="020B0604020202020204" pitchFamily="34" charset="0"/>
+              <a:buChar char="•"/>
+              <a:defRPr sz="1800" kern="1200">
+                <a:solidFill>
+                  <a:schemeClr val="tx1"/>
+                </a:solidFill>
+                <a:latin typeface="+mn-lt"/>
+                <a:ea typeface="+mn-ea"/>
+                <a:cs typeface="+mn-cs"/>
+              </a:defRPr>
+            </a:lvl5pPr>
+            <a:lvl6pPr marL="2514600" indent="-228600" algn="l" defTabSz="914400" rtl="0" eaLnBrk="1" latinLnBrk="0" hangingPunct="1">
+              <a:lnSpc>
+                <a:spcPct val="90000"/>
+              </a:lnSpc>
+              <a:spcBef>
+                <a:spcPts val="500"/>
+              </a:spcBef>
+              <a:buFont typeface="Arial" panose="020B0604020202020204" pitchFamily="34" charset="0"/>
+              <a:buChar char="•"/>
+              <a:defRPr sz="1800" kern="1200">
+                <a:solidFill>
+                  <a:schemeClr val="tx1"/>
+                </a:solidFill>
+                <a:latin typeface="+mn-lt"/>
+                <a:ea typeface="+mn-ea"/>
+                <a:cs typeface="+mn-cs"/>
+              </a:defRPr>
+            </a:lvl6pPr>
+            <a:lvl7pPr marL="2971800" indent="-228600" algn="l" defTabSz="914400" rtl="0" eaLnBrk="1" latinLnBrk="0" hangingPunct="1">
+              <a:lnSpc>
+                <a:spcPct val="90000"/>
+              </a:lnSpc>
+              <a:spcBef>
+                <a:spcPts val="500"/>
+              </a:spcBef>
+              <a:buFont typeface="Arial" panose="020B0604020202020204" pitchFamily="34" charset="0"/>
+              <a:buChar char="•"/>
+              <a:defRPr sz="1800" kern="1200">
+                <a:solidFill>
+                  <a:schemeClr val="tx1"/>
+                </a:solidFill>
+                <a:latin typeface="+mn-lt"/>
+                <a:ea typeface="+mn-ea"/>
+                <a:cs typeface="+mn-cs"/>
+              </a:defRPr>
+            </a:lvl7pPr>
+            <a:lvl8pPr marL="3429000" indent="-228600" algn="l" defTabSz="914400" rtl="0" eaLnBrk="1" latinLnBrk="0" hangingPunct="1">
+              <a:lnSpc>
+                <a:spcPct val="90000"/>
+              </a:lnSpc>
+              <a:spcBef>
+                <a:spcPts val="500"/>
+              </a:spcBef>
+              <a:buFont typeface="Arial" panose="020B0604020202020204" pitchFamily="34" charset="0"/>
+              <a:buChar char="•"/>
+              <a:defRPr sz="1800" kern="1200">
+                <a:solidFill>
+                  <a:schemeClr val="tx1"/>
+                </a:solidFill>
+                <a:latin typeface="+mn-lt"/>
+                <a:ea typeface="+mn-ea"/>
+                <a:cs typeface="+mn-cs"/>
+              </a:defRPr>
+            </a:lvl8pPr>
+            <a:lvl9pPr marL="3886200" indent="-228600" algn="l" defTabSz="914400" rtl="0" eaLnBrk="1" latinLnBrk="0" hangingPunct="1">
+              <a:lnSpc>
+                <a:spcPct val="90000"/>
+              </a:lnSpc>
+              <a:spcBef>
+                <a:spcPts val="500"/>
+              </a:spcBef>
+              <a:buFont typeface="Arial" panose="020B0604020202020204" pitchFamily="34" charset="0"/>
+              <a:buChar char="•"/>
+              <a:defRPr sz="1800" kern="1200">
+                <a:solidFill>
+                  <a:schemeClr val="tx1"/>
+                </a:solidFill>
+                <a:latin typeface="+mn-lt"/>
+                <a:ea typeface="+mn-ea"/>
+                <a:cs typeface="+mn-cs"/>
+              </a:defRPr>
+            </a:lvl9pPr>
+          </a:lstStyle>
+          <a:p>
+            <a:r>
               <a:rPr lang="en-US" dirty="0"/>
               <a:t>25 sensors:</a:t>
             </a:r>
@@ -3674,6 +4577,13 @@
   <p:clrMapOvr>
     <a:masterClrMapping/>
   </p:clrMapOvr>
+  <p:timing>
+    <p:tnLst>
+      <p:par>
+        <p:cTn id="1" dur="indefinite" restart="never" nodeType="tmRoot"/>
+      </p:par>
+    </p:tnLst>
+  </p:timing>
 </p:sld>
 </file>
 
@@ -4102,6 +5012,375 @@
   <p:clrMapOvr>
     <a:masterClrMapping/>
   </p:clrMapOvr>
+  <p:timing>
+    <p:tnLst>
+      <p:par>
+        <p:cTn id="1" dur="indefinite" restart="never" nodeType="tmRoot">
+          <p:childTnLst>
+            <p:seq concurrent="1" nextAc="seek">
+              <p:cTn id="2" dur="indefinite" nodeType="mainSeq">
+                <p:childTnLst>
+                  <p:par>
+                    <p:cTn id="3" fill="hold">
+                      <p:stCondLst>
+                        <p:cond delay="indefinite"/>
+                      </p:stCondLst>
+                      <p:childTnLst>
+                        <p:par>
+                          <p:cTn id="4" fill="hold">
+                            <p:stCondLst>
+                              <p:cond delay="0"/>
+                            </p:stCondLst>
+                            <p:childTnLst>
+                              <p:par>
+                                <p:cTn id="5" presetID="1" presetClass="entr" presetSubtype="0" fill="hold" nodeType="clickEffect">
+                                  <p:stCondLst>
+                                    <p:cond delay="0"/>
+                                  </p:stCondLst>
+                                  <p:childTnLst>
+                                    <p:set>
+                                      <p:cBhvr>
+                                        <p:cTn id="6" dur="1" fill="hold">
+                                          <p:stCondLst>
+                                            <p:cond delay="0"/>
+                                          </p:stCondLst>
+                                        </p:cTn>
+                                        <p:tgtEl>
+                                          <p:spTgt spid="8"/>
+                                        </p:tgtEl>
+                                        <p:attrNameLst>
+                                          <p:attrName>style.visibility</p:attrName>
+                                        </p:attrNameLst>
+                                      </p:cBhvr>
+                                      <p:to>
+                                        <p:strVal val="visible"/>
+                                      </p:to>
+                                    </p:set>
+                                  </p:childTnLst>
+                                </p:cTn>
+                              </p:par>
+                            </p:childTnLst>
+                          </p:cTn>
+                        </p:par>
+                      </p:childTnLst>
+                    </p:cTn>
+                  </p:par>
+                  <p:par>
+                    <p:cTn id="7" fill="hold">
+                      <p:stCondLst>
+                        <p:cond delay="indefinite"/>
+                      </p:stCondLst>
+                      <p:childTnLst>
+                        <p:par>
+                          <p:cTn id="8" fill="hold">
+                            <p:stCondLst>
+                              <p:cond delay="0"/>
+                            </p:stCondLst>
+                            <p:childTnLst>
+                              <p:par>
+                                <p:cTn id="9" presetID="1" presetClass="entr" presetSubtype="0" fill="hold" nodeType="clickEffect">
+                                  <p:stCondLst>
+                                    <p:cond delay="0"/>
+                                  </p:stCondLst>
+                                  <p:childTnLst>
+                                    <p:set>
+                                      <p:cBhvr>
+                                        <p:cTn id="10" dur="1" fill="hold">
+                                          <p:stCondLst>
+                                            <p:cond delay="0"/>
+                                          </p:stCondLst>
+                                        </p:cTn>
+                                        <p:tgtEl>
+                                          <p:spTgt spid="3">
+                                            <p:txEl>
+                                              <p:pRg st="0" end="0"/>
+                                            </p:txEl>
+                                          </p:spTgt>
+                                        </p:tgtEl>
+                                        <p:attrNameLst>
+                                          <p:attrName>style.visibility</p:attrName>
+                                        </p:attrNameLst>
+                                      </p:cBhvr>
+                                      <p:to>
+                                        <p:strVal val="visible"/>
+                                      </p:to>
+                                    </p:set>
+                                  </p:childTnLst>
+                                </p:cTn>
+                              </p:par>
+                            </p:childTnLst>
+                          </p:cTn>
+                        </p:par>
+                      </p:childTnLst>
+                    </p:cTn>
+                  </p:par>
+                  <p:par>
+                    <p:cTn id="11" fill="hold">
+                      <p:stCondLst>
+                        <p:cond delay="indefinite"/>
+                      </p:stCondLst>
+                      <p:childTnLst>
+                        <p:par>
+                          <p:cTn id="12" fill="hold">
+                            <p:stCondLst>
+                              <p:cond delay="0"/>
+                            </p:stCondLst>
+                            <p:childTnLst>
+                              <p:par>
+                                <p:cTn id="13" presetID="1" presetClass="entr" presetSubtype="0" fill="hold" nodeType="clickEffect">
+                                  <p:stCondLst>
+                                    <p:cond delay="0"/>
+                                  </p:stCondLst>
+                                  <p:childTnLst>
+                                    <p:set>
+                                      <p:cBhvr>
+                                        <p:cTn id="14" dur="1" fill="hold">
+                                          <p:stCondLst>
+                                            <p:cond delay="0"/>
+                                          </p:stCondLst>
+                                        </p:cTn>
+                                        <p:tgtEl>
+                                          <p:spTgt spid="3">
+                                            <p:txEl>
+                                              <p:pRg st="1" end="1"/>
+                                            </p:txEl>
+                                          </p:spTgt>
+                                        </p:tgtEl>
+                                        <p:attrNameLst>
+                                          <p:attrName>style.visibility</p:attrName>
+                                        </p:attrNameLst>
+                                      </p:cBhvr>
+                                      <p:to>
+                                        <p:strVal val="visible"/>
+                                      </p:to>
+                                    </p:set>
+                                  </p:childTnLst>
+                                </p:cTn>
+                              </p:par>
+                            </p:childTnLst>
+                          </p:cTn>
+                        </p:par>
+                      </p:childTnLst>
+                    </p:cTn>
+                  </p:par>
+                  <p:par>
+                    <p:cTn id="15" fill="hold">
+                      <p:stCondLst>
+                        <p:cond delay="indefinite"/>
+                      </p:stCondLst>
+                      <p:childTnLst>
+                        <p:par>
+                          <p:cTn id="16" fill="hold">
+                            <p:stCondLst>
+                              <p:cond delay="0"/>
+                            </p:stCondLst>
+                            <p:childTnLst>
+                              <p:par>
+                                <p:cTn id="17" presetID="1" presetClass="entr" presetSubtype="0" fill="hold" nodeType="clickEffect">
+                                  <p:stCondLst>
+                                    <p:cond delay="0"/>
+                                  </p:stCondLst>
+                                  <p:childTnLst>
+                                    <p:set>
+                                      <p:cBhvr>
+                                        <p:cTn id="18" dur="1" fill="hold">
+                                          <p:stCondLst>
+                                            <p:cond delay="0"/>
+                                          </p:stCondLst>
+                                        </p:cTn>
+                                        <p:tgtEl>
+                                          <p:spTgt spid="3">
+                                            <p:txEl>
+                                              <p:pRg st="2" end="2"/>
+                                            </p:txEl>
+                                          </p:spTgt>
+                                        </p:tgtEl>
+                                        <p:attrNameLst>
+                                          <p:attrName>style.visibility</p:attrName>
+                                        </p:attrNameLst>
+                                      </p:cBhvr>
+                                      <p:to>
+                                        <p:strVal val="visible"/>
+                                      </p:to>
+                                    </p:set>
+                                  </p:childTnLst>
+                                </p:cTn>
+                              </p:par>
+                            </p:childTnLst>
+                          </p:cTn>
+                        </p:par>
+                      </p:childTnLst>
+                    </p:cTn>
+                  </p:par>
+                  <p:par>
+                    <p:cTn id="19" fill="hold">
+                      <p:stCondLst>
+                        <p:cond delay="indefinite"/>
+                      </p:stCondLst>
+                      <p:childTnLst>
+                        <p:par>
+                          <p:cTn id="20" fill="hold">
+                            <p:stCondLst>
+                              <p:cond delay="0"/>
+                            </p:stCondLst>
+                            <p:childTnLst>
+                              <p:par>
+                                <p:cTn id="21" presetID="1" presetClass="entr" presetSubtype="0" fill="hold" nodeType="clickEffect">
+                                  <p:stCondLst>
+                                    <p:cond delay="0"/>
+                                  </p:stCondLst>
+                                  <p:childTnLst>
+                                    <p:set>
+                                      <p:cBhvr>
+                                        <p:cTn id="22" dur="1" fill="hold">
+                                          <p:stCondLst>
+                                            <p:cond delay="0"/>
+                                          </p:stCondLst>
+                                        </p:cTn>
+                                        <p:tgtEl>
+                                          <p:spTgt spid="3">
+                                            <p:txEl>
+                                              <p:pRg st="3" end="3"/>
+                                            </p:txEl>
+                                          </p:spTgt>
+                                        </p:tgtEl>
+                                        <p:attrNameLst>
+                                          <p:attrName>style.visibility</p:attrName>
+                                        </p:attrNameLst>
+                                      </p:cBhvr>
+                                      <p:to>
+                                        <p:strVal val="visible"/>
+                                      </p:to>
+                                    </p:set>
+                                  </p:childTnLst>
+                                </p:cTn>
+                              </p:par>
+                            </p:childTnLst>
+                          </p:cTn>
+                        </p:par>
+                      </p:childTnLst>
+                    </p:cTn>
+                  </p:par>
+                  <p:par>
+                    <p:cTn id="23" fill="hold">
+                      <p:stCondLst>
+                        <p:cond delay="indefinite"/>
+                      </p:stCondLst>
+                      <p:childTnLst>
+                        <p:par>
+                          <p:cTn id="24" fill="hold">
+                            <p:stCondLst>
+                              <p:cond delay="0"/>
+                            </p:stCondLst>
+                            <p:childTnLst>
+                              <p:par>
+                                <p:cTn id="25" presetID="1" presetClass="entr" presetSubtype="0" fill="hold" nodeType="clickEffect">
+                                  <p:stCondLst>
+                                    <p:cond delay="0"/>
+                                  </p:stCondLst>
+                                  <p:childTnLst>
+                                    <p:set>
+                                      <p:cBhvr>
+                                        <p:cTn id="26" dur="1" fill="hold">
+                                          <p:stCondLst>
+                                            <p:cond delay="0"/>
+                                          </p:stCondLst>
+                                        </p:cTn>
+                                        <p:tgtEl>
+                                          <p:spTgt spid="3">
+                                            <p:txEl>
+                                              <p:pRg st="4" end="4"/>
+                                            </p:txEl>
+                                          </p:spTgt>
+                                        </p:tgtEl>
+                                        <p:attrNameLst>
+                                          <p:attrName>style.visibility</p:attrName>
+                                        </p:attrNameLst>
+                                      </p:cBhvr>
+                                      <p:to>
+                                        <p:strVal val="visible"/>
+                                      </p:to>
+                                    </p:set>
+                                  </p:childTnLst>
+                                </p:cTn>
+                              </p:par>
+                            </p:childTnLst>
+                          </p:cTn>
+                        </p:par>
+                      </p:childTnLst>
+                    </p:cTn>
+                  </p:par>
+                  <p:par>
+                    <p:cTn id="27" fill="hold">
+                      <p:stCondLst>
+                        <p:cond delay="indefinite"/>
+                      </p:stCondLst>
+                      <p:childTnLst>
+                        <p:par>
+                          <p:cTn id="28" fill="hold">
+                            <p:stCondLst>
+                              <p:cond delay="0"/>
+                            </p:stCondLst>
+                            <p:childTnLst>
+                              <p:par>
+                                <p:cTn id="29" presetID="1" presetClass="entr" presetSubtype="0" fill="hold" nodeType="clickEffect">
+                                  <p:stCondLst>
+                                    <p:cond delay="0"/>
+                                  </p:stCondLst>
+                                  <p:childTnLst>
+                                    <p:set>
+                                      <p:cBhvr>
+                                        <p:cTn id="30" dur="1" fill="hold">
+                                          <p:stCondLst>
+                                            <p:cond delay="0"/>
+                                          </p:stCondLst>
+                                        </p:cTn>
+                                        <p:tgtEl>
+                                          <p:spTgt spid="3">
+                                            <p:txEl>
+                                              <p:pRg st="5" end="5"/>
+                                            </p:txEl>
+                                          </p:spTgt>
+                                        </p:tgtEl>
+                                        <p:attrNameLst>
+                                          <p:attrName>style.visibility</p:attrName>
+                                        </p:attrNameLst>
+                                      </p:cBhvr>
+                                      <p:to>
+                                        <p:strVal val="visible"/>
+                                      </p:to>
+                                    </p:set>
+                                  </p:childTnLst>
+                                </p:cTn>
+                              </p:par>
+                            </p:childTnLst>
+                          </p:cTn>
+                        </p:par>
+                      </p:childTnLst>
+                    </p:cTn>
+                  </p:par>
+                </p:childTnLst>
+              </p:cTn>
+              <p:prevCondLst>
+                <p:cond evt="onPrev" delay="0">
+                  <p:tgtEl>
+                    <p:sldTgt/>
+                  </p:tgtEl>
+                </p:cond>
+              </p:prevCondLst>
+              <p:nextCondLst>
+                <p:cond evt="onNext" delay="0">
+                  <p:tgtEl>
+                    <p:sldTgt/>
+                  </p:tgtEl>
+                </p:cond>
+              </p:nextCondLst>
+            </p:seq>
+          </p:childTnLst>
+        </p:cTn>
+      </p:par>
+    </p:tnLst>
+  </p:timing>
 </p:sld>
 </file>
 
@@ -4337,6 +5616,13 @@
   <p:clrMapOvr>
     <a:masterClrMapping/>
   </p:clrMapOvr>
+  <p:timing>
+    <p:tnLst>
+      <p:par>
+        <p:cTn id="1" dur="indefinite" restart="never" nodeType="tmRoot"/>
+      </p:par>
+    </p:tnLst>
+  </p:timing>
 </p:sld>
 </file>
 
@@ -4418,6 +5704,13 @@
   <p:clrMapOvr>
     <a:masterClrMapping/>
   </p:clrMapOvr>
+  <p:timing>
+    <p:tnLst>
+      <p:par>
+        <p:cTn id="1" dur="indefinite" restart="never" nodeType="tmRoot"/>
+      </p:par>
+    </p:tnLst>
+  </p:timing>
 </p:sld>
 </file>
 
@@ -4522,9 +5815,16 @@
                 </a:r>
               </a:p>
               <a:p>
+                <a:endParaRPr lang="en-US" dirty="0" smtClean="0"/>
+              </a:p>
+              <a:p>
+                <a:r>
+                  <a:rPr lang="en-US" dirty="0" smtClean="0"/>
+                  <a:t>We </a:t>
+                </a:r>
                 <a:r>
                   <a:rPr lang="en-US" dirty="0"/>
-                  <a:t>We convert each distinct 5 seconds from the data into a single feature vector, namely:  </a:t>
+                  <a:t>convert each distinct 5 seconds from the data into a single feature vector, namely:  </a:t>
                 </a:r>
                 <a14:m>
                   <m:oMath xmlns:m="http://schemas.openxmlformats.org/officeDocument/2006/math">
@@ -4561,7 +5861,19 @@
                               <a:rPr lang="en-US" b="0" i="1" smtClean="0">
                                 <a:latin typeface="Cambria Math" panose="02040503050406030204" pitchFamily="18" charset="0"/>
                               </a:rPr>
-                              <m:t>10000×25</m:t>
+                              <m:t>10000</m:t>
+                            </m:r>
+                            <m:r>
+                              <a:rPr lang="en-US" b="0" i="1" smtClean="0">
+                                <a:latin typeface="Cambria Math" panose="02040503050406030204" pitchFamily="18" charset="0"/>
+                              </a:rPr>
+                              <m:t>×</m:t>
+                            </m:r>
+                            <m:r>
+                              <a:rPr lang="en-US" b="0" i="1" smtClean="0">
+                                <a:latin typeface="Cambria Math" panose="02040503050406030204" pitchFamily="18" charset="0"/>
+                              </a:rPr>
+                              <m:t>25</m:t>
                             </m:r>
                           </m:e>
                         </m:d>
@@ -4594,18 +5906,28 @@
                           <a:rPr lang="en-US" b="0" i="1" dirty="0" smtClean="0">
                             <a:latin typeface="Cambria Math" panose="02040503050406030204" pitchFamily="18" charset="0"/>
                           </a:rPr>
-                          <m:t>325×1</m:t>
+                          <m:t>325</m:t>
+                        </m:r>
+                        <m:r>
+                          <a:rPr lang="en-US" b="0" i="1" dirty="0" smtClean="0">
+                            <a:latin typeface="Cambria Math" panose="02040503050406030204" pitchFamily="18" charset="0"/>
+                          </a:rPr>
+                          <m:t>×</m:t>
+                        </m:r>
+                        <m:r>
+                          <a:rPr lang="en-US" b="0" i="1" dirty="0" smtClean="0">
+                            <a:latin typeface="Cambria Math" panose="02040503050406030204" pitchFamily="18" charset="0"/>
+                          </a:rPr>
+                          <m:t>1</m:t>
                         </m:r>
                       </m:sub>
                     </m:sSub>
                   </m:oMath>
                 </a14:m>
                 <a:r>
-                  <a:rPr lang="en-US" dirty="0"/>
-                  <a:t>. (more on this later on…)</a:t>
+                  <a:rPr lang="en-US" dirty="0" smtClean="0"/>
+                  <a:t>.</a:t>
                 </a:r>
-              </a:p>
-              <a:p>
                 <a:endParaRPr lang="en-US" dirty="0"/>
               </a:p>
               <a:p>
@@ -4619,12 +5941,6 @@
               </a:p>
               <a:p>
                 <a:endParaRPr lang="en-US" dirty="0"/>
-              </a:p>
-              <a:p>
-                <a:r>
-                  <a:rPr lang="en-US" dirty="0"/>
-                  <a:t>Based on the log-book, we apply different classifiers on the low dimensional data.</a:t>
-                </a:r>
               </a:p>
               <a:p>
                 <a:pPr marL="0" indent="0">
@@ -4654,7 +5970,7 @@
               <a:blipFill>
                 <a:blip r:embed="rId2"/>
                 <a:stretch>
-                  <a:fillRect l="-900" t="-1881" r="-850"/>
+                  <a:fillRect l="-900" t="-1881"/>
                 </a:stretch>
               </a:blipFill>
             </p:spPr>
@@ -4675,16 +5991,16 @@
       </mc:AlternateContent>
       <p:grpSp>
         <p:nvGrpSpPr>
-          <p:cNvPr id="22" name="Group 21"/>
+          <p:cNvPr id="27" name="Group 26"/>
           <p:cNvGrpSpPr/>
           <p:nvPr/>
         </p:nvGrpSpPr>
         <p:grpSpPr>
           <a:xfrm>
-            <a:off x="2437885" y="3708516"/>
-            <a:ext cx="7625955" cy="2426928"/>
-            <a:chOff x="247135" y="3660891"/>
-            <a:chExt cx="7625955" cy="2426928"/>
+            <a:off x="835619" y="4222865"/>
+            <a:ext cx="10482663" cy="2426929"/>
+            <a:chOff x="924202" y="4222865"/>
+            <a:chExt cx="10482663" cy="2426929"/>
           </a:xfrm>
         </p:grpSpPr>
         <p:pic>
@@ -4703,7 +6019,7 @@
           </p:blipFill>
           <p:spPr>
             <a:xfrm>
-              <a:off x="247135" y="3660891"/>
+              <a:off x="2285485" y="4222866"/>
               <a:ext cx="5431770" cy="1857246"/>
             </a:xfrm>
             <a:prstGeom prst="rect">
@@ -4719,7 +6035,7 @@
           </p:nvSpPr>
           <p:spPr>
             <a:xfrm>
-              <a:off x="247135" y="3661398"/>
+              <a:off x="2285485" y="4223373"/>
               <a:ext cx="774357" cy="1856232"/>
             </a:xfrm>
             <a:prstGeom prst="rect">
@@ -4764,7 +6080,7 @@
           </p:nvSpPr>
           <p:spPr>
             <a:xfrm>
-              <a:off x="1021492" y="3661398"/>
+              <a:off x="3059842" y="4223373"/>
               <a:ext cx="774357" cy="1856232"/>
             </a:xfrm>
             <a:prstGeom prst="rect">
@@ -4809,7 +6125,7 @@
           </p:nvSpPr>
           <p:spPr>
             <a:xfrm>
-              <a:off x="1795849" y="3661398"/>
+              <a:off x="3834199" y="4223373"/>
               <a:ext cx="774357" cy="1856232"/>
             </a:xfrm>
             <a:prstGeom prst="rect">
@@ -4854,7 +6170,7 @@
           </p:nvSpPr>
           <p:spPr>
             <a:xfrm>
-              <a:off x="2570206" y="3661398"/>
+              <a:off x="4608556" y="4223373"/>
               <a:ext cx="774357" cy="1856232"/>
             </a:xfrm>
             <a:prstGeom prst="rect">
@@ -4899,7 +6215,7 @@
           </p:nvSpPr>
           <p:spPr>
             <a:xfrm>
-              <a:off x="3344563" y="3661398"/>
+              <a:off x="5382913" y="4223373"/>
               <a:ext cx="774357" cy="1856232"/>
             </a:xfrm>
             <a:prstGeom prst="rect">
@@ -4944,7 +6260,7 @@
           </p:nvSpPr>
           <p:spPr>
             <a:xfrm>
-              <a:off x="4118920" y="3661398"/>
+              <a:off x="6157270" y="4223373"/>
               <a:ext cx="774357" cy="1856232"/>
             </a:xfrm>
             <a:prstGeom prst="rect">
@@ -4989,7 +6305,7 @@
           </p:nvSpPr>
           <p:spPr>
             <a:xfrm>
-              <a:off x="4894923" y="3661398"/>
+              <a:off x="6933273" y="4223373"/>
               <a:ext cx="774357" cy="1856232"/>
             </a:xfrm>
             <a:prstGeom prst="rect">
@@ -5029,53 +6345,13 @@
         </p:sp>
         <p:sp>
           <p:nvSpPr>
-            <p:cNvPr id="12" name="Notched Right Arrow 11"/>
-            <p:cNvSpPr/>
-            <p:nvPr/>
-          </p:nvSpPr>
-          <p:spPr>
-            <a:xfrm>
-              <a:off x="5804034" y="4360244"/>
-              <a:ext cx="972152" cy="229270"/>
-            </a:xfrm>
-            <a:prstGeom prst="notchedRightArrow">
-              <a:avLst/>
-            </a:prstGeom>
-          </p:spPr>
-          <p:style>
-            <a:lnRef idx="2">
-              <a:schemeClr val="accent1">
-                <a:shade val="50000"/>
-              </a:schemeClr>
-            </a:lnRef>
-            <a:fillRef idx="1">
-              <a:schemeClr val="accent1"/>
-            </a:fillRef>
-            <a:effectRef idx="0">
-              <a:schemeClr val="accent1"/>
-            </a:effectRef>
-            <a:fontRef idx="minor">
-              <a:schemeClr val="lt1"/>
-            </a:fontRef>
-          </p:style>
-          <p:txBody>
-            <a:bodyPr rtlCol="0" anchor="ctr"/>
-            <a:lstStyle/>
-            <a:p>
-              <a:pPr algn="ctr"/>
-              <a:endParaRPr lang="en-US"/>
-            </a:p>
-          </p:txBody>
-        </p:sp>
-        <p:sp>
-          <p:nvSpPr>
             <p:cNvPr id="13" name="Rectangle 12"/>
             <p:cNvSpPr/>
             <p:nvPr/>
           </p:nvSpPr>
           <p:spPr>
             <a:xfrm>
-              <a:off x="6912971" y="3687626"/>
+              <a:off x="10446746" y="4222865"/>
               <a:ext cx="45719" cy="1856232"/>
             </a:xfrm>
             <a:prstGeom prst="rect">
@@ -5118,7 +6394,7 @@
           </p:nvSpPr>
           <p:spPr>
             <a:xfrm>
-              <a:off x="7065371" y="3687626"/>
+              <a:off x="10599146" y="4222865"/>
               <a:ext cx="45719" cy="1856232"/>
             </a:xfrm>
             <a:prstGeom prst="rect">
@@ -5166,7 +6442,7 @@
           </p:nvSpPr>
           <p:spPr>
             <a:xfrm>
-              <a:off x="7217771" y="3687626"/>
+              <a:off x="10751546" y="4222865"/>
               <a:ext cx="45719" cy="1856232"/>
             </a:xfrm>
             <a:prstGeom prst="rect">
@@ -5214,7 +6490,7 @@
           </p:nvSpPr>
           <p:spPr>
             <a:xfrm>
-              <a:off x="7370171" y="3687626"/>
+              <a:off x="10903946" y="4222865"/>
               <a:ext cx="45719" cy="1856232"/>
             </a:xfrm>
             <a:prstGeom prst="rect">
@@ -5262,7 +6538,7 @@
           </p:nvSpPr>
           <p:spPr>
             <a:xfrm>
-              <a:off x="7522571" y="3687626"/>
+              <a:off x="11056346" y="4222865"/>
               <a:ext cx="45719" cy="1856232"/>
             </a:xfrm>
             <a:prstGeom prst="rect">
@@ -5310,7 +6586,7 @@
           </p:nvSpPr>
           <p:spPr>
             <a:xfrm rot="5400000">
-              <a:off x="2106076" y="5259032"/>
+              <a:off x="4144426" y="5821007"/>
               <a:ext cx="155448" cy="725101"/>
             </a:xfrm>
             <a:prstGeom prst="rightBrace">
@@ -5356,7 +6632,7 @@
           </p:nvSpPr>
           <p:spPr>
             <a:xfrm>
-              <a:off x="1821249" y="5718487"/>
+              <a:off x="3859599" y="6280462"/>
               <a:ext cx="709656" cy="369332"/>
             </a:xfrm>
             <a:prstGeom prst="rect">
@@ -5385,7 +6661,7 @@
           </p:nvSpPr>
           <p:spPr>
             <a:xfrm>
-              <a:off x="7674971" y="3687626"/>
+              <a:off x="11208746" y="4222865"/>
               <a:ext cx="45719" cy="1856232"/>
             </a:xfrm>
             <a:prstGeom prst="rect">
@@ -5433,7 +6709,7 @@
           </p:nvSpPr>
           <p:spPr>
             <a:xfrm>
-              <a:off x="7827371" y="3687626"/>
+              <a:off x="11361146" y="4222865"/>
               <a:ext cx="45719" cy="1856232"/>
             </a:xfrm>
             <a:prstGeom prst="rect">
@@ -5477,83 +6753,130 @@
             </a:p>
           </p:txBody>
         </p:sp>
+        <p:sp>
+          <p:nvSpPr>
+            <p:cNvPr id="23" name="Right Brace 22"/>
+            <p:cNvSpPr/>
+            <p:nvPr/>
+          </p:nvSpPr>
+          <p:spPr>
+            <a:xfrm rot="10800000">
+              <a:off x="1964589" y="4222866"/>
+              <a:ext cx="252504" cy="1856231"/>
+            </a:xfrm>
+            <a:prstGeom prst="rightBrace">
+              <a:avLst>
+                <a:gd name="adj1" fmla="val 118627"/>
+                <a:gd name="adj2" fmla="val 50000"/>
+              </a:avLst>
+            </a:prstGeom>
+            <a:ln w="19050">
+              <a:solidFill>
+                <a:schemeClr val="tx1"/>
+              </a:solidFill>
+            </a:ln>
+          </p:spPr>
+          <p:style>
+            <a:lnRef idx="1">
+              <a:schemeClr val="accent1"/>
+            </a:lnRef>
+            <a:fillRef idx="0">
+              <a:schemeClr val="accent1"/>
+            </a:fillRef>
+            <a:effectRef idx="0">
+              <a:schemeClr val="accent1"/>
+            </a:effectRef>
+            <a:fontRef idx="minor">
+              <a:schemeClr val="tx1"/>
+            </a:fontRef>
+          </p:style>
+          <p:txBody>
+            <a:bodyPr rtlCol="0" anchor="ctr"/>
+            <a:lstStyle/>
+            <a:p>
+              <a:pPr algn="ctr"/>
+              <a:endParaRPr lang="en-US"/>
+            </a:p>
+          </p:txBody>
+        </p:sp>
+        <p:sp>
+          <p:nvSpPr>
+            <p:cNvPr id="24" name="TextBox 23"/>
+            <p:cNvSpPr txBox="1"/>
+            <p:nvPr/>
+          </p:nvSpPr>
+          <p:spPr>
+            <a:xfrm>
+              <a:off x="924202" y="4881913"/>
+              <a:ext cx="1030761" cy="646331"/>
+            </a:xfrm>
+            <a:prstGeom prst="rect">
+              <a:avLst/>
+            </a:prstGeom>
+            <a:noFill/>
+          </p:spPr>
+          <p:txBody>
+            <a:bodyPr wrap="square" rtlCol="0">
+              <a:spAutoFit/>
+            </a:bodyPr>
+            <a:lstStyle/>
+            <a:p>
+              <a:pPr algn="ctr"/>
+              <a:r>
+                <a:rPr lang="en-US" dirty="0"/>
+                <a:t>All 25 channels</a:t>
+              </a:r>
+            </a:p>
+          </p:txBody>
+        </p:sp>
+        <p:sp>
+          <p:nvSpPr>
+            <p:cNvPr id="26" name="Right Arrow 25"/>
+            <p:cNvSpPr/>
+            <p:nvPr/>
+          </p:nvSpPr>
+          <p:spPr>
+            <a:xfrm>
+              <a:off x="7848600" y="4251440"/>
+              <a:ext cx="2495550" cy="1682635"/>
+            </a:xfrm>
+            <a:prstGeom prst="rightArrow">
+              <a:avLst>
+                <a:gd name="adj1" fmla="val 46603"/>
+                <a:gd name="adj2" fmla="val 50000"/>
+              </a:avLst>
+            </a:prstGeom>
+          </p:spPr>
+          <p:style>
+            <a:lnRef idx="2">
+              <a:schemeClr val="accent1">
+                <a:shade val="50000"/>
+              </a:schemeClr>
+            </a:lnRef>
+            <a:fillRef idx="1">
+              <a:schemeClr val="accent1"/>
+            </a:fillRef>
+            <a:effectRef idx="0">
+              <a:schemeClr val="accent1"/>
+            </a:effectRef>
+            <a:fontRef idx="minor">
+              <a:schemeClr val="lt1"/>
+            </a:fontRef>
+          </p:style>
+          <p:txBody>
+            <a:bodyPr rtlCol="0" anchor="ctr"/>
+            <a:lstStyle/>
+            <a:p>
+              <a:pPr algn="ctr"/>
+              <a:r>
+                <a:rPr lang="en-US" sz="2400" b="1" dirty="0" smtClean="0"/>
+                <a:t>Features Selection</a:t>
+              </a:r>
+              <a:endParaRPr lang="en-US" sz="2400" b="1" dirty="0"/>
+            </a:p>
+          </p:txBody>
+        </p:sp>
       </p:grpSp>
-      <p:sp>
-        <p:nvSpPr>
-          <p:cNvPr id="23" name="Right Brace 22"/>
-          <p:cNvSpPr/>
-          <p:nvPr/>
-        </p:nvSpPr>
-        <p:spPr>
-          <a:xfrm rot="10800000">
-            <a:off x="2116989" y="3708516"/>
-            <a:ext cx="252504" cy="1856231"/>
-          </a:xfrm>
-          <a:prstGeom prst="rightBrace">
-            <a:avLst>
-              <a:gd name="adj1" fmla="val 118627"/>
-              <a:gd name="adj2" fmla="val 50000"/>
-            </a:avLst>
-          </a:prstGeom>
-          <a:ln w="19050">
-            <a:solidFill>
-              <a:schemeClr val="tx1"/>
-            </a:solidFill>
-          </a:ln>
-        </p:spPr>
-        <p:style>
-          <a:lnRef idx="1">
-            <a:schemeClr val="accent1"/>
-          </a:lnRef>
-          <a:fillRef idx="0">
-            <a:schemeClr val="accent1"/>
-          </a:fillRef>
-          <a:effectRef idx="0">
-            <a:schemeClr val="accent1"/>
-          </a:effectRef>
-          <a:fontRef idx="minor">
-            <a:schemeClr val="tx1"/>
-          </a:fontRef>
-        </p:style>
-        <p:txBody>
-          <a:bodyPr rtlCol="0" anchor="ctr"/>
-          <a:lstStyle/>
-          <a:p>
-            <a:pPr algn="ctr"/>
-            <a:endParaRPr lang="en-US"/>
-          </a:p>
-        </p:txBody>
-      </p:sp>
-      <p:sp>
-        <p:nvSpPr>
-          <p:cNvPr id="24" name="TextBox 23"/>
-          <p:cNvSpPr txBox="1"/>
-          <p:nvPr/>
-        </p:nvSpPr>
-        <p:spPr>
-          <a:xfrm>
-            <a:off x="1076602" y="4367563"/>
-            <a:ext cx="1030761" cy="646331"/>
-          </a:xfrm>
-          <a:prstGeom prst="rect">
-            <a:avLst/>
-          </a:prstGeom>
-          <a:noFill/>
-        </p:spPr>
-        <p:txBody>
-          <a:bodyPr wrap="square" rtlCol="0">
-            <a:spAutoFit/>
-          </a:bodyPr>
-          <a:lstStyle/>
-          <a:p>
-            <a:pPr algn="ctr"/>
-            <a:r>
-              <a:rPr lang="en-US" dirty="0"/>
-              <a:t>All 25 channels</a:t>
-            </a:r>
-          </a:p>
-        </p:txBody>
-      </p:sp>
     </p:spTree>
     <p:extLst>
       <p:ext uri="{BB962C8B-B14F-4D97-AF65-F5344CB8AC3E}">
@@ -5564,10 +6887,823 @@
   <p:clrMapOvr>
     <a:masterClrMapping/>
   </p:clrMapOvr>
+  <p:timing>
+    <p:tnLst>
+      <p:par>
+        <p:cTn id="1" dur="indefinite" restart="never" nodeType="tmRoot">
+          <p:childTnLst>
+            <p:seq concurrent="1" nextAc="seek">
+              <p:cTn id="2" dur="indefinite" nodeType="mainSeq">
+                <p:childTnLst>
+                  <p:par>
+                    <p:cTn id="3" fill="hold">
+                      <p:stCondLst>
+                        <p:cond delay="indefinite"/>
+                      </p:stCondLst>
+                      <p:childTnLst>
+                        <p:par>
+                          <p:cTn id="4" fill="hold">
+                            <p:stCondLst>
+                              <p:cond delay="0"/>
+                            </p:stCondLst>
+                            <p:childTnLst>
+                              <p:par>
+                                <p:cTn id="5" presetID="1" presetClass="entr" presetSubtype="0" fill="hold" nodeType="clickEffect">
+                                  <p:stCondLst>
+                                    <p:cond delay="0"/>
+                                  </p:stCondLst>
+                                  <p:childTnLst>
+                                    <p:set>
+                                      <p:cBhvr>
+                                        <p:cTn id="6" dur="1" fill="hold">
+                                          <p:stCondLst>
+                                            <p:cond delay="0"/>
+                                          </p:stCondLst>
+                                        </p:cTn>
+                                        <p:tgtEl>
+                                          <p:spTgt spid="3">
+                                            <p:txEl>
+                                              <p:pRg st="0" end="0"/>
+                                            </p:txEl>
+                                          </p:spTgt>
+                                        </p:tgtEl>
+                                        <p:attrNameLst>
+                                          <p:attrName>style.visibility</p:attrName>
+                                        </p:attrNameLst>
+                                      </p:cBhvr>
+                                      <p:to>
+                                        <p:strVal val="visible"/>
+                                      </p:to>
+                                    </p:set>
+                                  </p:childTnLst>
+                                </p:cTn>
+                              </p:par>
+                            </p:childTnLst>
+                          </p:cTn>
+                        </p:par>
+                      </p:childTnLst>
+                    </p:cTn>
+                  </p:par>
+                  <p:par>
+                    <p:cTn id="7" fill="hold">
+                      <p:stCondLst>
+                        <p:cond delay="indefinite"/>
+                      </p:stCondLst>
+                      <p:childTnLst>
+                        <p:par>
+                          <p:cTn id="8" fill="hold">
+                            <p:stCondLst>
+                              <p:cond delay="0"/>
+                            </p:stCondLst>
+                            <p:childTnLst>
+                              <p:par>
+                                <p:cTn id="9" presetID="1" presetClass="entr" presetSubtype="0" fill="hold" nodeType="clickEffect">
+                                  <p:stCondLst>
+                                    <p:cond delay="0"/>
+                                  </p:stCondLst>
+                                  <p:childTnLst>
+                                    <p:set>
+                                      <p:cBhvr>
+                                        <p:cTn id="10" dur="1" fill="hold">
+                                          <p:stCondLst>
+                                            <p:cond delay="0"/>
+                                          </p:stCondLst>
+                                        </p:cTn>
+                                        <p:tgtEl>
+                                          <p:spTgt spid="3">
+                                            <p:txEl>
+                                              <p:pRg st="1" end="1"/>
+                                            </p:txEl>
+                                          </p:spTgt>
+                                        </p:tgtEl>
+                                        <p:attrNameLst>
+                                          <p:attrName>style.visibility</p:attrName>
+                                        </p:attrNameLst>
+                                      </p:cBhvr>
+                                      <p:to>
+                                        <p:strVal val="visible"/>
+                                      </p:to>
+                                    </p:set>
+                                  </p:childTnLst>
+                                </p:cTn>
+                              </p:par>
+                            </p:childTnLst>
+                          </p:cTn>
+                        </p:par>
+                      </p:childTnLst>
+                    </p:cTn>
+                  </p:par>
+                  <p:par>
+                    <p:cTn id="11" fill="hold">
+                      <p:stCondLst>
+                        <p:cond delay="indefinite"/>
+                      </p:stCondLst>
+                      <p:childTnLst>
+                        <p:par>
+                          <p:cTn id="12" fill="hold">
+                            <p:stCondLst>
+                              <p:cond delay="0"/>
+                            </p:stCondLst>
+                            <p:childTnLst>
+                              <p:par>
+                                <p:cTn id="13" presetID="1" presetClass="entr" presetSubtype="0" fill="hold" nodeType="clickEffect">
+                                  <p:stCondLst>
+                                    <p:cond delay="0"/>
+                                  </p:stCondLst>
+                                  <p:childTnLst>
+                                    <p:set>
+                                      <p:cBhvr>
+                                        <p:cTn id="14" dur="1" fill="hold">
+                                          <p:stCondLst>
+                                            <p:cond delay="0"/>
+                                          </p:stCondLst>
+                                        </p:cTn>
+                                        <p:tgtEl>
+                                          <p:spTgt spid="3">
+                                            <p:txEl>
+                                              <p:pRg st="2" end="2"/>
+                                            </p:txEl>
+                                          </p:spTgt>
+                                        </p:tgtEl>
+                                        <p:attrNameLst>
+                                          <p:attrName>style.visibility</p:attrName>
+                                        </p:attrNameLst>
+                                      </p:cBhvr>
+                                      <p:to>
+                                        <p:strVal val="visible"/>
+                                      </p:to>
+                                    </p:set>
+                                  </p:childTnLst>
+                                </p:cTn>
+                              </p:par>
+                            </p:childTnLst>
+                          </p:cTn>
+                        </p:par>
+                      </p:childTnLst>
+                    </p:cTn>
+                  </p:par>
+                  <p:par>
+                    <p:cTn id="15" fill="hold">
+                      <p:stCondLst>
+                        <p:cond delay="indefinite"/>
+                      </p:stCondLst>
+                      <p:childTnLst>
+                        <p:par>
+                          <p:cTn id="16" fill="hold">
+                            <p:stCondLst>
+                              <p:cond delay="0"/>
+                            </p:stCondLst>
+                            <p:childTnLst>
+                              <p:par>
+                                <p:cTn id="17" presetID="1" presetClass="entr" presetSubtype="0" fill="hold" nodeType="clickEffect">
+                                  <p:stCondLst>
+                                    <p:cond delay="0"/>
+                                  </p:stCondLst>
+                                  <p:childTnLst>
+                                    <p:set>
+                                      <p:cBhvr>
+                                        <p:cTn id="18" dur="1" fill="hold">
+                                          <p:stCondLst>
+                                            <p:cond delay="0"/>
+                                          </p:stCondLst>
+                                        </p:cTn>
+                                        <p:tgtEl>
+                                          <p:spTgt spid="3">
+                                            <p:txEl>
+                                              <p:pRg st="4" end="4"/>
+                                            </p:txEl>
+                                          </p:spTgt>
+                                        </p:tgtEl>
+                                        <p:attrNameLst>
+                                          <p:attrName>style.visibility</p:attrName>
+                                        </p:attrNameLst>
+                                      </p:cBhvr>
+                                      <p:to>
+                                        <p:strVal val="visible"/>
+                                      </p:to>
+                                    </p:set>
+                                  </p:childTnLst>
+                                </p:cTn>
+                              </p:par>
+                            </p:childTnLst>
+                          </p:cTn>
+                        </p:par>
+                      </p:childTnLst>
+                    </p:cTn>
+                  </p:par>
+                  <p:par>
+                    <p:cTn id="19" fill="hold">
+                      <p:stCondLst>
+                        <p:cond delay="indefinite"/>
+                      </p:stCondLst>
+                      <p:childTnLst>
+                        <p:par>
+                          <p:cTn id="20" fill="hold">
+                            <p:stCondLst>
+                              <p:cond delay="0"/>
+                            </p:stCondLst>
+                            <p:childTnLst>
+                              <p:par>
+                                <p:cTn id="21" presetID="1" presetClass="entr" presetSubtype="0" fill="hold" nodeType="clickEffect">
+                                  <p:stCondLst>
+                                    <p:cond delay="0"/>
+                                  </p:stCondLst>
+                                  <p:childTnLst>
+                                    <p:set>
+                                      <p:cBhvr>
+                                        <p:cTn id="22" dur="1" fill="hold">
+                                          <p:stCondLst>
+                                            <p:cond delay="0"/>
+                                          </p:stCondLst>
+                                        </p:cTn>
+                                        <p:tgtEl>
+                                          <p:spTgt spid="27"/>
+                                        </p:tgtEl>
+                                        <p:attrNameLst>
+                                          <p:attrName>style.visibility</p:attrName>
+                                        </p:attrNameLst>
+                                      </p:cBhvr>
+                                      <p:to>
+                                        <p:strVal val="visible"/>
+                                      </p:to>
+                                    </p:set>
+                                  </p:childTnLst>
+                                </p:cTn>
+                              </p:par>
+                            </p:childTnLst>
+                          </p:cTn>
+                        </p:par>
+                      </p:childTnLst>
+                    </p:cTn>
+                  </p:par>
+                </p:childTnLst>
+              </p:cTn>
+              <p:prevCondLst>
+                <p:cond evt="onPrev" delay="0">
+                  <p:tgtEl>
+                    <p:sldTgt/>
+                  </p:tgtEl>
+                </p:cond>
+              </p:prevCondLst>
+              <p:nextCondLst>
+                <p:cond evt="onNext" delay="0">
+                  <p:tgtEl>
+                    <p:sldTgt/>
+                  </p:tgtEl>
+                </p:cond>
+              </p:nextCondLst>
+            </p:seq>
+          </p:childTnLst>
+        </p:cTn>
+      </p:par>
+    </p:tnLst>
+  </p:timing>
 </p:sld>
 </file>
 
 <file path=ppt/slides/slide7.xml><?xml version="1.0" encoding="utf-8"?>
+<p:sld xmlns:a="http://schemas.openxmlformats.org/drawingml/2006/main" xmlns:r="http://schemas.openxmlformats.org/officeDocument/2006/relationships" xmlns:p="http://schemas.openxmlformats.org/presentationml/2006/main">
+  <p:cSld>
+    <p:spTree>
+      <p:nvGrpSpPr>
+        <p:cNvPr id="1" name=""/>
+        <p:cNvGrpSpPr/>
+        <p:nvPr/>
+      </p:nvGrpSpPr>
+      <p:grpSpPr>
+        <a:xfrm>
+          <a:off x="0" y="0"/>
+          <a:ext cx="0" cy="0"/>
+          <a:chOff x="0" y="0"/>
+          <a:chExt cx="0" cy="0"/>
+        </a:xfrm>
+      </p:grpSpPr>
+      <p:pic>
+        <p:nvPicPr>
+          <p:cNvPr id="4" name="Picture 3"/>
+          <p:cNvPicPr>
+            <a:picLocks noChangeAspect="1"/>
+          </p:cNvPicPr>
+          <p:nvPr/>
+        </p:nvPicPr>
+        <p:blipFill>
+          <a:blip r:embed="rId2"/>
+          <a:stretch>
+            <a:fillRect/>
+          </a:stretch>
+        </p:blipFill>
+        <p:spPr>
+          <a:xfrm>
+            <a:off x="6496050" y="4200525"/>
+            <a:ext cx="5695950" cy="2657475"/>
+          </a:xfrm>
+          <a:prstGeom prst="rect">
+            <a:avLst/>
+          </a:prstGeom>
+        </p:spPr>
+      </p:pic>
+      <p:sp>
+        <p:nvSpPr>
+          <p:cNvPr id="2" name="Title 1"/>
+          <p:cNvSpPr>
+            <a:spLocks noGrp="1"/>
+          </p:cNvSpPr>
+          <p:nvPr>
+            <p:ph type="title"/>
+          </p:nvPr>
+        </p:nvSpPr>
+        <p:spPr>
+          <a:xfrm>
+            <a:off x="0" y="-276225"/>
+            <a:ext cx="10515600" cy="1325563"/>
+          </a:xfrm>
+        </p:spPr>
+        <p:txBody>
+          <a:bodyPr/>
+          <a:lstStyle/>
+          <a:p>
+            <a:r>
+              <a:rPr lang="en-US" dirty="0" smtClean="0"/>
+              <a:t>Approach for features selection	</a:t>
+            </a:r>
+            <a:endParaRPr lang="en-US" dirty="0"/>
+          </a:p>
+        </p:txBody>
+      </p:sp>
+      <mc:AlternateContent xmlns:mc="http://schemas.openxmlformats.org/markup-compatibility/2006">
+        <mc:Choice xmlns:a14="http://schemas.microsoft.com/office/drawing/2010/main" Requires="a14">
+          <p:sp>
+            <p:nvSpPr>
+              <p:cNvPr id="3" name="Content Placeholder 2"/>
+              <p:cNvSpPr>
+                <a:spLocks noGrp="1"/>
+              </p:cNvSpPr>
+              <p:nvPr>
+                <p:ph idx="1"/>
+              </p:nvPr>
+            </p:nvSpPr>
+            <p:spPr>
+              <a:xfrm>
+                <a:off x="0" y="876300"/>
+                <a:ext cx="12192000" cy="5981700"/>
+              </a:xfrm>
+            </p:spPr>
+            <p:txBody>
+              <a:bodyPr>
+                <a:normAutofit/>
+              </a:bodyPr>
+              <a:lstStyle/>
+              <a:p>
+                <a:r>
+                  <a:rPr lang="en-US" dirty="0" smtClean="0"/>
+                  <a:t>Our approach is based on Geometry analysis &amp; learning.</a:t>
+                </a:r>
+              </a:p>
+              <a:p>
+                <a:endParaRPr lang="en-US" dirty="0" smtClean="0"/>
+              </a:p>
+              <a:p>
+                <a:r>
+                  <a:rPr lang="en-US" dirty="0" smtClean="0"/>
+                  <a:t>For now, we test only spatial features:</a:t>
+                </a:r>
+              </a:p>
+              <a:p>
+                <a:pPr lvl="1"/>
+                <a:r>
+                  <a:rPr lang="en-US" dirty="0" smtClean="0"/>
+                  <a:t>For each time leg we estimate the covariance matrix, namely </a:t>
+                </a:r>
+                <a14:m>
+                  <m:oMath xmlns:m="http://schemas.openxmlformats.org/officeDocument/2006/math">
+                    <m:sSub>
+                      <m:sSubPr>
+                        <m:ctrlPr>
+                          <a:rPr lang="en-US" b="0" i="1" smtClean="0">
+                            <a:latin typeface="Cambria Math" panose="02040503050406030204" pitchFamily="18" charset="0"/>
+                          </a:rPr>
+                        </m:ctrlPr>
+                      </m:sSubPr>
+                      <m:e>
+                        <m:r>
+                          <a:rPr lang="en-US" b="1" i="0" smtClean="0">
+                            <a:latin typeface="Cambria Math" panose="02040503050406030204" pitchFamily="18" charset="0"/>
+                          </a:rPr>
+                          <m:t>𝐂</m:t>
+                        </m:r>
+                      </m:e>
+                      <m:sub>
+                        <m:r>
+                          <a:rPr lang="en-US" b="0" i="1" smtClean="0">
+                            <a:latin typeface="Cambria Math" panose="02040503050406030204" pitchFamily="18" charset="0"/>
+                          </a:rPr>
+                          <m:t>𝑖</m:t>
+                        </m:r>
+                      </m:sub>
+                    </m:sSub>
+                    <m:r>
+                      <a:rPr lang="en-US" b="0" i="1" smtClean="0">
+                        <a:latin typeface="Cambria Math" panose="02040503050406030204" pitchFamily="18" charset="0"/>
+                      </a:rPr>
+                      <m:t>=</m:t>
+                    </m:r>
+                    <m:f>
+                      <m:fPr>
+                        <m:ctrlPr>
+                          <a:rPr lang="en-US" b="0" i="1" smtClean="0">
+                            <a:latin typeface="Cambria Math" panose="02040503050406030204" pitchFamily="18" charset="0"/>
+                          </a:rPr>
+                        </m:ctrlPr>
+                      </m:fPr>
+                      <m:num>
+                        <m:r>
+                          <a:rPr lang="en-US" b="0" i="1" smtClean="0">
+                            <a:latin typeface="Cambria Math" panose="02040503050406030204" pitchFamily="18" charset="0"/>
+                          </a:rPr>
+                          <m:t>1</m:t>
+                        </m:r>
+                      </m:num>
+                      <m:den>
+                        <m:r>
+                          <a:rPr lang="en-US" b="0" i="1" smtClean="0">
+                            <a:latin typeface="Cambria Math" panose="02040503050406030204" pitchFamily="18" charset="0"/>
+                          </a:rPr>
+                          <m:t>𝑁</m:t>
+                        </m:r>
+                        <m:r>
+                          <a:rPr lang="en-US" b="0" i="1" smtClean="0">
+                            <a:latin typeface="Cambria Math" panose="02040503050406030204" pitchFamily="18" charset="0"/>
+                          </a:rPr>
+                          <m:t>−</m:t>
+                        </m:r>
+                        <m:r>
+                          <a:rPr lang="en-US" b="0" i="1" smtClean="0">
+                            <a:latin typeface="Cambria Math" panose="02040503050406030204" pitchFamily="18" charset="0"/>
+                          </a:rPr>
+                          <m:t>1</m:t>
+                        </m:r>
+                      </m:den>
+                    </m:f>
+                    <m:r>
+                      <a:rPr lang="en-US" b="1" i="1" smtClean="0">
+                        <a:latin typeface="Cambria Math" panose="02040503050406030204" pitchFamily="18" charset="0"/>
+                      </a:rPr>
+                      <m:t>𝑿</m:t>
+                    </m:r>
+                    <m:sSup>
+                      <m:sSupPr>
+                        <m:ctrlPr>
+                          <a:rPr lang="en-US" b="1" i="1" smtClean="0">
+                            <a:latin typeface="Cambria Math" panose="02040503050406030204" pitchFamily="18" charset="0"/>
+                          </a:rPr>
+                        </m:ctrlPr>
+                      </m:sSupPr>
+                      <m:e>
+                        <m:r>
+                          <a:rPr lang="en-US" b="1" i="1" smtClean="0">
+                            <a:latin typeface="Cambria Math" panose="02040503050406030204" pitchFamily="18" charset="0"/>
+                          </a:rPr>
+                          <m:t>𝑿</m:t>
+                        </m:r>
+                      </m:e>
+                      <m:sup>
+                        <m:r>
+                          <a:rPr lang="en-US" b="0" i="1" smtClean="0">
+                            <a:latin typeface="Cambria Math" panose="02040503050406030204" pitchFamily="18" charset="0"/>
+                          </a:rPr>
+                          <m:t>𝑇</m:t>
+                        </m:r>
+                      </m:sup>
+                    </m:sSup>
+                  </m:oMath>
+                </a14:m>
+                <a:endParaRPr lang="en-US" b="1" dirty="0" smtClean="0"/>
+              </a:p>
+              <a:p>
+                <a:endParaRPr lang="en-US" dirty="0" smtClean="0"/>
+              </a:p>
+              <a:p>
+                <a:r>
+                  <a:rPr lang="en-US" dirty="0" smtClean="0"/>
+                  <a:t>The covariance matrices are all positive definite.</a:t>
+                </a:r>
+                <a:br>
+                  <a:rPr lang="en-US" dirty="0" smtClean="0"/>
+                </a:br>
+                <a:r>
+                  <a:rPr lang="en-US" dirty="0" smtClean="0"/>
+                  <a:t>Thus, they are lay on the manifold </a:t>
+                </a:r>
+                <a14:m>
+                  <m:oMath xmlns:m="http://schemas.openxmlformats.org/officeDocument/2006/math">
+                    <m:r>
+                      <a:rPr lang="en-US" b="0" i="1" smtClean="0">
+                        <a:latin typeface="Cambria Math" panose="02040503050406030204" pitchFamily="18" charset="0"/>
+                      </a:rPr>
+                      <m:t>ℳ</m:t>
+                    </m:r>
+                  </m:oMath>
+                </a14:m>
+                <a:r>
+                  <a:rPr lang="en-US" dirty="0" smtClean="0"/>
+                  <a:t>, which embedded in the space of symmetric matrices.</a:t>
+                </a:r>
+              </a:p>
+              <a:p>
+                <a:endParaRPr lang="en-US" dirty="0" smtClean="0"/>
+              </a:p>
+              <a:p>
+                <a:endParaRPr lang="en-US" dirty="0" smtClean="0"/>
+              </a:p>
+              <a:p>
+                <a:r>
+                  <a:rPr lang="en-US" dirty="0" smtClean="0"/>
+                  <a:t>On this manifold we use a Riemannian metric</a:t>
+                </a:r>
+                <a:r>
+                  <a:rPr lang="en-US" dirty="0"/>
+                  <a:t/>
+                </a:r>
+                <a:br>
+                  <a:rPr lang="en-US" dirty="0"/>
+                </a:br>
+                <a:r>
+                  <a:rPr lang="en-US" dirty="0" smtClean="0"/>
+                  <a:t>instead of the naïve Euclidean metric.</a:t>
+                </a:r>
+              </a:p>
+            </p:txBody>
+          </p:sp>
+        </mc:Choice>
+        <mc:Fallback>
+          <p:sp>
+            <p:nvSpPr>
+              <p:cNvPr id="3" name="Content Placeholder 2"/>
+              <p:cNvSpPr>
+                <a:spLocks noGrp="1" noRot="1" noChangeAspect="1" noMove="1" noResize="1" noEditPoints="1" noAdjustHandles="1" noChangeArrowheads="1" noChangeShapeType="1" noTextEdit="1"/>
+              </p:cNvSpPr>
+              <p:nvPr>
+                <p:ph idx="1"/>
+              </p:nvPr>
+            </p:nvSpPr>
+            <p:spPr>
+              <a:xfrm>
+                <a:off x="0" y="876300"/>
+                <a:ext cx="12192000" cy="5981700"/>
+              </a:xfrm>
+              <a:blipFill>
+                <a:blip r:embed="rId3"/>
+                <a:stretch>
+                  <a:fillRect l="-900" t="-1733"/>
+                </a:stretch>
+              </a:blipFill>
+            </p:spPr>
+            <p:txBody>
+              <a:bodyPr/>
+              <a:lstStyle/>
+              <a:p>
+                <a:r>
+                  <a:rPr lang="en-US">
+                    <a:noFill/>
+                  </a:rPr>
+                  <a:t> </a:t>
+                </a:r>
+              </a:p>
+            </p:txBody>
+          </p:sp>
+        </mc:Fallback>
+      </mc:AlternateContent>
+    </p:spTree>
+    <p:extLst>
+      <p:ext uri="{BB962C8B-B14F-4D97-AF65-F5344CB8AC3E}">
+        <p14:creationId xmlns:p14="http://schemas.microsoft.com/office/powerpoint/2010/main" val="1915042487"/>
+      </p:ext>
+    </p:extLst>
+  </p:cSld>
+  <p:clrMapOvr>
+    <a:masterClrMapping/>
+  </p:clrMapOvr>
+  <p:timing>
+    <p:tnLst>
+      <p:par>
+        <p:cTn id="1" dur="indefinite" restart="never" nodeType="tmRoot"/>
+      </p:par>
+    </p:tnLst>
+  </p:timing>
+</p:sld>
+</file>
+
+<file path=ppt/slides/slide8.xml><?xml version="1.0" encoding="utf-8"?>
+<p:sld xmlns:a="http://schemas.openxmlformats.org/drawingml/2006/main" xmlns:r="http://schemas.openxmlformats.org/officeDocument/2006/relationships" xmlns:p="http://schemas.openxmlformats.org/presentationml/2006/main">
+  <p:cSld>
+    <p:spTree>
+      <p:nvGrpSpPr>
+        <p:cNvPr id="1" name=""/>
+        <p:cNvGrpSpPr/>
+        <p:nvPr/>
+      </p:nvGrpSpPr>
+      <p:grpSpPr>
+        <a:xfrm>
+          <a:off x="0" y="0"/>
+          <a:ext cx="0" cy="0"/>
+          <a:chOff x="0" y="0"/>
+          <a:chExt cx="0" cy="0"/>
+        </a:xfrm>
+      </p:grpSpPr>
+      <p:sp>
+        <p:nvSpPr>
+          <p:cNvPr id="3" name="Content Placeholder 2"/>
+          <p:cNvSpPr>
+            <a:spLocks noGrp="1"/>
+          </p:cNvSpPr>
+          <p:nvPr>
+            <p:ph idx="1"/>
+          </p:nvPr>
+        </p:nvSpPr>
+        <p:spPr>
+          <a:xfrm>
+            <a:off x="0" y="1347102"/>
+            <a:ext cx="4514850" cy="5510898"/>
+          </a:xfrm>
+        </p:spPr>
+        <p:txBody>
+          <a:bodyPr>
+            <a:normAutofit/>
+          </a:bodyPr>
+          <a:lstStyle/>
+          <a:p>
+            <a:r>
+              <a:rPr lang="en-US" dirty="0" smtClean="0"/>
+              <a:t>12:00 – 13:30</a:t>
+            </a:r>
+          </a:p>
+          <a:p>
+            <a:r>
+              <a:rPr lang="en-US" dirty="0" smtClean="0"/>
+              <a:t>4 events</a:t>
+            </a:r>
+            <a:endParaRPr lang="en-US" dirty="0"/>
+          </a:p>
+          <a:p>
+            <a:r>
+              <a:rPr lang="en-US" dirty="0" smtClean="0"/>
+              <a:t>Class 0 - No event</a:t>
+            </a:r>
+          </a:p>
+          <a:p>
+            <a:r>
+              <a:rPr lang="en-US" dirty="0" smtClean="0"/>
+              <a:t>Class 1 - Event</a:t>
+            </a:r>
+          </a:p>
+          <a:p>
+            <a:endParaRPr lang="en-US" dirty="0" smtClean="0"/>
+          </a:p>
+          <a:p>
+            <a:r>
+              <a:rPr lang="en-US" dirty="0" smtClean="0"/>
+              <a:t>Overall 93.6%</a:t>
+            </a:r>
+            <a:endParaRPr lang="en-US" dirty="0"/>
+          </a:p>
+          <a:p>
+            <a:endParaRPr lang="en-US" dirty="0" smtClean="0"/>
+          </a:p>
+          <a:p>
+            <a:r>
+              <a:rPr lang="en-US" dirty="0" smtClean="0">
+                <a:solidFill>
+                  <a:srgbClr val="FFC000"/>
+                </a:solidFill>
+              </a:rPr>
+              <a:t>We assume most error occur due to coarse labeling. </a:t>
+            </a:r>
+            <a:endParaRPr lang="en-US" dirty="0">
+              <a:solidFill>
+                <a:srgbClr val="FFC000"/>
+              </a:solidFill>
+            </a:endParaRPr>
+          </a:p>
+        </p:txBody>
+      </p:sp>
+      <p:sp>
+        <p:nvSpPr>
+          <p:cNvPr id="5" name="Title 1"/>
+          <p:cNvSpPr txBox="1">
+            <a:spLocks/>
+          </p:cNvSpPr>
+          <p:nvPr/>
+        </p:nvSpPr>
+        <p:spPr>
+          <a:xfrm>
+            <a:off x="0" y="-73711"/>
+            <a:ext cx="10515600" cy="1325563"/>
+          </a:xfrm>
+          <a:prstGeom prst="rect">
+            <a:avLst/>
+          </a:prstGeom>
+        </p:spPr>
+        <p:txBody>
+          <a:bodyPr vert="horz" lIns="91440" tIns="45720" rIns="91440" bIns="45720" rtlCol="0" anchor="ctr">
+            <a:normAutofit/>
+          </a:bodyPr>
+          <a:lstStyle>
+            <a:lvl1pPr algn="l" defTabSz="914400" rtl="0" eaLnBrk="1" latinLnBrk="0" hangingPunct="1">
+              <a:lnSpc>
+                <a:spcPct val="90000"/>
+              </a:lnSpc>
+              <a:spcBef>
+                <a:spcPct val="0"/>
+              </a:spcBef>
+              <a:buNone/>
+              <a:defRPr sz="4400" kern="1200">
+                <a:solidFill>
+                  <a:schemeClr val="tx1"/>
+                </a:solidFill>
+                <a:latin typeface="+mj-lt"/>
+                <a:ea typeface="+mj-ea"/>
+                <a:cs typeface="+mj-cs"/>
+              </a:defRPr>
+            </a:lvl1pPr>
+          </a:lstStyle>
+          <a:p>
+            <a:r>
+              <a:rPr lang="en-US" dirty="0" smtClean="0"/>
+              <a:t>Preliminary Results  - Event Detection</a:t>
+            </a:r>
+            <a:endParaRPr lang="en-US" dirty="0"/>
+          </a:p>
+        </p:txBody>
+      </p:sp>
+      <p:pic>
+        <p:nvPicPr>
+          <p:cNvPr id="9" name="Picture 8"/>
+          <p:cNvPicPr>
+            <a:picLocks noChangeAspect="1"/>
+          </p:cNvPicPr>
+          <p:nvPr/>
+        </p:nvPicPr>
+        <p:blipFill>
+          <a:blip r:embed="rId2"/>
+          <a:stretch>
+            <a:fillRect/>
+          </a:stretch>
+        </p:blipFill>
+        <p:spPr>
+          <a:xfrm>
+            <a:off x="10515600" y="59189"/>
+            <a:ext cx="1638300" cy="3295650"/>
+          </a:xfrm>
+          <a:prstGeom prst="rect">
+            <a:avLst/>
+          </a:prstGeom>
+        </p:spPr>
+      </p:pic>
+      <p:pic>
+        <p:nvPicPr>
+          <p:cNvPr id="10" name="Picture 9"/>
+          <p:cNvPicPr>
+            <a:picLocks noChangeAspect="1"/>
+          </p:cNvPicPr>
+          <p:nvPr/>
+        </p:nvPicPr>
+        <p:blipFill>
+          <a:blip r:embed="rId3"/>
+          <a:stretch>
+            <a:fillRect/>
+          </a:stretch>
+        </p:blipFill>
+        <p:spPr>
+          <a:xfrm>
+            <a:off x="4514850" y="958053"/>
+            <a:ext cx="5785321" cy="5882936"/>
+          </a:xfrm>
+          <a:prstGeom prst="rect">
+            <a:avLst/>
+          </a:prstGeom>
+        </p:spPr>
+      </p:pic>
+    </p:spTree>
+    <p:extLst>
+      <p:ext uri="{BB962C8B-B14F-4D97-AF65-F5344CB8AC3E}">
+        <p14:creationId xmlns:p14="http://schemas.microsoft.com/office/powerpoint/2010/main" val="14469950"/>
+      </p:ext>
+    </p:extLst>
+  </p:cSld>
+  <p:clrMapOvr>
+    <a:masterClrMapping/>
+  </p:clrMapOvr>
+  <p:timing>
+    <p:tnLst>
+      <p:par>
+        <p:cTn id="1" dur="indefinite" restart="never" nodeType="tmRoot"/>
+      </p:par>
+    </p:tnLst>
+  </p:timing>
+</p:sld>
+</file>
+
+<file path=ppt/slides/slide9.xml><?xml version="1.0" encoding="utf-8"?>
 <p:sld xmlns:a="http://schemas.openxmlformats.org/drawingml/2006/main" xmlns:r="http://schemas.openxmlformats.org/officeDocument/2006/relationships" xmlns:p="http://schemas.openxmlformats.org/presentationml/2006/main">
   <p:cSld>
     <p:spTree>
@@ -6073,6 +8209,13 @@
   <p:clrMapOvr>
     <a:masterClrMapping/>
   </p:clrMapOvr>
+  <p:timing>
+    <p:tnLst>
+      <p:par>
+        <p:cTn id="1" dur="indefinite" restart="never" nodeType="tmRoot"/>
+      </p:par>
+    </p:tnLst>
+  </p:timing>
 </p:sld>
 </file>
 

</xml_diff>